<commit_message>
Petit à petit, on avance ...
</commit_message>
<xml_diff>
--- a/01_DipolesSources/TD_02_JaugeExtensometrie_Wheatstone/images/Figures.pptx
+++ b/01_DipolesSources/TD_02_JaugeExtensometrie_Wheatstone/images/Figures.pptx
@@ -294,7 +294,7 @@
             <a:fld id="{47C414CA-3B1E-4C42-B862-7A4C61ED653A}" type="datetimeFigureOut">
               <a:rPr lang="fr-FR" smtClean="0"/>
               <a:pPr/>
-              <a:t>25/09/2014</a:t>
+              <a:t>05/10/2014</a:t>
             </a:fld>
             <a:endParaRPr lang="fr-FR"/>
           </a:p>
@@ -466,7 +466,7 @@
             <a:fld id="{47C414CA-3B1E-4C42-B862-7A4C61ED653A}" type="datetimeFigureOut">
               <a:rPr lang="fr-FR" smtClean="0"/>
               <a:pPr/>
-              <a:t>25/09/2014</a:t>
+              <a:t>05/10/2014</a:t>
             </a:fld>
             <a:endParaRPr lang="fr-FR"/>
           </a:p>
@@ -648,7 +648,7 @@
             <a:fld id="{47C414CA-3B1E-4C42-B862-7A4C61ED653A}" type="datetimeFigureOut">
               <a:rPr lang="fr-FR" smtClean="0"/>
               <a:pPr/>
-              <a:t>25/09/2014</a:t>
+              <a:t>05/10/2014</a:t>
             </a:fld>
             <a:endParaRPr lang="fr-FR"/>
           </a:p>
@@ -820,7 +820,7 @@
             <a:fld id="{47C414CA-3B1E-4C42-B862-7A4C61ED653A}" type="datetimeFigureOut">
               <a:rPr lang="fr-FR" smtClean="0"/>
               <a:pPr/>
-              <a:t>25/09/2014</a:t>
+              <a:t>05/10/2014</a:t>
             </a:fld>
             <a:endParaRPr lang="fr-FR"/>
           </a:p>
@@ -1068,7 +1068,7 @@
             <a:fld id="{47C414CA-3B1E-4C42-B862-7A4C61ED653A}" type="datetimeFigureOut">
               <a:rPr lang="fr-FR" smtClean="0"/>
               <a:pPr/>
-              <a:t>25/09/2014</a:t>
+              <a:t>05/10/2014</a:t>
             </a:fld>
             <a:endParaRPr lang="fr-FR"/>
           </a:p>
@@ -1358,7 +1358,7 @@
             <a:fld id="{47C414CA-3B1E-4C42-B862-7A4C61ED653A}" type="datetimeFigureOut">
               <a:rPr lang="fr-FR" smtClean="0"/>
               <a:pPr/>
-              <a:t>25/09/2014</a:t>
+              <a:t>05/10/2014</a:t>
             </a:fld>
             <a:endParaRPr lang="fr-FR"/>
           </a:p>
@@ -1782,7 +1782,7 @@
             <a:fld id="{47C414CA-3B1E-4C42-B862-7A4C61ED653A}" type="datetimeFigureOut">
               <a:rPr lang="fr-FR" smtClean="0"/>
               <a:pPr/>
-              <a:t>25/09/2014</a:t>
+              <a:t>05/10/2014</a:t>
             </a:fld>
             <a:endParaRPr lang="fr-FR"/>
           </a:p>
@@ -1902,7 +1902,7 @@
             <a:fld id="{47C414CA-3B1E-4C42-B862-7A4C61ED653A}" type="datetimeFigureOut">
               <a:rPr lang="fr-FR" smtClean="0"/>
               <a:pPr/>
-              <a:t>25/09/2014</a:t>
+              <a:t>05/10/2014</a:t>
             </a:fld>
             <a:endParaRPr lang="fr-FR"/>
           </a:p>
@@ -1999,7 +1999,7 @@
             <a:fld id="{47C414CA-3B1E-4C42-B862-7A4C61ED653A}" type="datetimeFigureOut">
               <a:rPr lang="fr-FR" smtClean="0"/>
               <a:pPr/>
-              <a:t>25/09/2014</a:t>
+              <a:t>05/10/2014</a:t>
             </a:fld>
             <a:endParaRPr lang="fr-FR"/>
           </a:p>
@@ -2278,7 +2278,7 @@
             <a:fld id="{47C414CA-3B1E-4C42-B862-7A4C61ED653A}" type="datetimeFigureOut">
               <a:rPr lang="fr-FR" smtClean="0"/>
               <a:pPr/>
-              <a:t>25/09/2014</a:t>
+              <a:t>05/10/2014</a:t>
             </a:fld>
             <a:endParaRPr lang="fr-FR"/>
           </a:p>
@@ -2533,7 +2533,7 @@
             <a:fld id="{47C414CA-3B1E-4C42-B862-7A4C61ED653A}" type="datetimeFigureOut">
               <a:rPr lang="fr-FR" smtClean="0"/>
               <a:pPr/>
-              <a:t>25/09/2014</a:t>
+              <a:t>05/10/2014</a:t>
             </a:fld>
             <a:endParaRPr lang="fr-FR"/>
           </a:p>
@@ -2748,7 +2748,7 @@
             <a:fld id="{47C414CA-3B1E-4C42-B862-7A4C61ED653A}" type="datetimeFigureOut">
               <a:rPr lang="fr-FR" smtClean="0"/>
               <a:pPr/>
-              <a:t>25/09/2014</a:t>
+              <a:t>05/10/2014</a:t>
             </a:fld>
             <a:endParaRPr lang="fr-FR"/>
           </a:p>
@@ -3126,750 +3126,1517 @@
       </p:grpSpPr>
       <p:grpSp>
         <p:nvGrpSpPr>
-          <p:cNvPr id="33" name="Groupe 32"/>
+          <p:cNvPr id="3" name="Groupe 2"/>
           <p:cNvGrpSpPr/>
           <p:nvPr/>
         </p:nvGrpSpPr>
         <p:grpSpPr>
           <a:xfrm>
-            <a:off x="2221069" y="1015218"/>
-            <a:ext cx="1845463" cy="1836819"/>
-            <a:chOff x="788328" y="382251"/>
-            <a:chExt cx="1845463" cy="1836819"/>
+            <a:off x="2915816" y="1402530"/>
+            <a:ext cx="3995111" cy="2047306"/>
+            <a:chOff x="1205616" y="911770"/>
+            <a:chExt cx="3995111" cy="2047306"/>
           </a:xfrm>
         </p:grpSpPr>
         <p:grpSp>
           <p:nvGrpSpPr>
-            <p:cNvPr id="8" name="Groupe 7"/>
+            <p:cNvPr id="33" name="Groupe 32"/>
             <p:cNvGrpSpPr/>
             <p:nvPr/>
           </p:nvGrpSpPr>
           <p:grpSpPr>
-            <a:xfrm rot="2700000">
-              <a:off x="1238328" y="382251"/>
-              <a:ext cx="180000" cy="1080000"/>
-              <a:chOff x="2555776" y="1062184"/>
-              <a:chExt cx="180000" cy="1080000"/>
+            <a:xfrm>
+              <a:off x="2221069" y="1015218"/>
+              <a:ext cx="1845463" cy="1836819"/>
+              <a:chOff x="788328" y="382251"/>
+              <a:chExt cx="1845463" cy="1836819"/>
             </a:xfrm>
           </p:grpSpPr>
-          <p:sp>
-            <p:nvSpPr>
-              <p:cNvPr id="4" name="Rectangle 3"/>
-              <p:cNvSpPr/>
+          <p:grpSp>
+            <p:nvGrpSpPr>
+              <p:cNvPr id="8" name="Groupe 7"/>
+              <p:cNvGrpSpPr/>
               <p:nvPr/>
-            </p:nvSpPr>
-            <p:spPr>
-              <a:xfrm>
-                <a:off x="2555776" y="1422184"/>
-                <a:ext cx="180000" cy="360000"/>
+            </p:nvGrpSpPr>
+            <p:grpSpPr>
+              <a:xfrm rot="2700000">
+                <a:off x="1238328" y="382251"/>
+                <a:ext cx="180000" cy="1080000"/>
+                <a:chOff x="2555776" y="1062184"/>
+                <a:chExt cx="180000" cy="1080000"/>
               </a:xfrm>
-              <a:prstGeom prst="rect">
-                <a:avLst/>
-              </a:prstGeom>
+            </p:grpSpPr>
+            <p:sp>
+              <p:nvSpPr>
+                <p:cNvPr id="4" name="Rectangle 3"/>
+                <p:cNvSpPr/>
+                <p:nvPr/>
+              </p:nvSpPr>
+              <p:spPr>
+                <a:xfrm>
+                  <a:off x="2555776" y="1422184"/>
+                  <a:ext cx="180000" cy="360000"/>
+                </a:xfrm>
+                <a:prstGeom prst="rect">
+                  <a:avLst/>
+                </a:prstGeom>
+                <a:noFill/>
+                <a:ln w="12700">
+                  <a:solidFill>
+                    <a:srgbClr val="7030A0"/>
+                  </a:solidFill>
+                </a:ln>
+              </p:spPr>
+              <p:style>
+                <a:lnRef idx="2">
+                  <a:schemeClr val="accent1">
+                    <a:shade val="50000"/>
+                  </a:schemeClr>
+                </a:lnRef>
+                <a:fillRef idx="1">
+                  <a:schemeClr val="accent1"/>
+                </a:fillRef>
+                <a:effectRef idx="0">
+                  <a:schemeClr val="accent1"/>
+                </a:effectRef>
+                <a:fontRef idx="minor">
+                  <a:schemeClr val="lt1"/>
+                </a:fontRef>
+              </p:style>
+              <p:txBody>
+                <a:bodyPr rtlCol="0" anchor="ctr"/>
+                <a:lstStyle/>
+                <a:p>
+                  <a:pPr algn="ctr"/>
+                  <a:endParaRPr lang="fr-FR"/>
+                </a:p>
+              </p:txBody>
+            </p:sp>
+            <p:cxnSp>
+              <p:nvCxnSpPr>
+                <p:cNvPr id="5" name="Connecteur droit 4"/>
+                <p:cNvCxnSpPr>
+                  <a:endCxn id="4" idx="2"/>
+                </p:cNvCxnSpPr>
+                <p:nvPr/>
+              </p:nvCxnSpPr>
+              <p:spPr>
+                <a:xfrm flipV="1">
+                  <a:off x="2645776" y="1782184"/>
+                  <a:ext cx="0" cy="360000"/>
+                </a:xfrm>
+                <a:prstGeom prst="line">
+                  <a:avLst/>
+                </a:prstGeom>
+                <a:noFill/>
+                <a:ln w="12700">
+                  <a:solidFill>
+                    <a:srgbClr val="0070C0"/>
+                  </a:solidFill>
+                  <a:headEnd type="oval" w="sm" len="sm"/>
+                </a:ln>
+              </p:spPr>
+              <p:style>
+                <a:lnRef idx="2">
+                  <a:schemeClr val="accent1">
+                    <a:shade val="50000"/>
+                  </a:schemeClr>
+                </a:lnRef>
+                <a:fillRef idx="1">
+                  <a:schemeClr val="accent1"/>
+                </a:fillRef>
+                <a:effectRef idx="0">
+                  <a:schemeClr val="accent1"/>
+                </a:effectRef>
+                <a:fontRef idx="minor">
+                  <a:schemeClr val="lt1"/>
+                </a:fontRef>
+              </p:style>
+            </p:cxnSp>
+            <p:cxnSp>
+              <p:nvCxnSpPr>
+                <p:cNvPr id="6" name="Connecteur droit 5"/>
+                <p:cNvCxnSpPr>
+                  <a:stCxn id="4" idx="0"/>
+                </p:cNvCxnSpPr>
+                <p:nvPr/>
+              </p:nvCxnSpPr>
+              <p:spPr>
+                <a:xfrm flipV="1">
+                  <a:off x="2645776" y="1062184"/>
+                  <a:ext cx="0" cy="360000"/>
+                </a:xfrm>
+                <a:prstGeom prst="line">
+                  <a:avLst/>
+                </a:prstGeom>
+                <a:noFill/>
+                <a:ln w="12700">
+                  <a:solidFill>
+                    <a:srgbClr val="0070C0"/>
+                  </a:solidFill>
+                  <a:headEnd type="none"/>
+                  <a:tailEnd type="oval" w="sm" len="sm"/>
+                </a:ln>
+              </p:spPr>
+              <p:style>
+                <a:lnRef idx="2">
+                  <a:schemeClr val="accent1">
+                    <a:shade val="50000"/>
+                  </a:schemeClr>
+                </a:lnRef>
+                <a:fillRef idx="1">
+                  <a:schemeClr val="accent1"/>
+                </a:fillRef>
+                <a:effectRef idx="0">
+                  <a:schemeClr val="accent1"/>
+                </a:effectRef>
+                <a:fontRef idx="minor">
+                  <a:schemeClr val="lt1"/>
+                </a:fontRef>
+              </p:style>
+            </p:cxnSp>
+          </p:grpSp>
+          <p:grpSp>
+            <p:nvGrpSpPr>
+              <p:cNvPr id="21" name="Groupe 20"/>
+              <p:cNvGrpSpPr/>
+              <p:nvPr/>
+            </p:nvGrpSpPr>
+            <p:grpSpPr>
+              <a:xfrm rot="2700000">
+                <a:off x="2003791" y="1142212"/>
+                <a:ext cx="180000" cy="1080000"/>
+                <a:chOff x="2555776" y="1062184"/>
+                <a:chExt cx="180000" cy="1080000"/>
+              </a:xfrm>
+            </p:grpSpPr>
+            <p:sp>
+              <p:nvSpPr>
+                <p:cNvPr id="22" name="Rectangle 21"/>
+                <p:cNvSpPr/>
+                <p:nvPr/>
+              </p:nvSpPr>
+              <p:spPr>
+                <a:xfrm>
+                  <a:off x="2555776" y="1422184"/>
+                  <a:ext cx="180000" cy="360000"/>
+                </a:xfrm>
+                <a:prstGeom prst="rect">
+                  <a:avLst/>
+                </a:prstGeom>
+                <a:noFill/>
+                <a:ln w="12700">
+                  <a:solidFill>
+                    <a:srgbClr val="FFC000"/>
+                  </a:solidFill>
+                </a:ln>
+              </p:spPr>
+              <p:style>
+                <a:lnRef idx="2">
+                  <a:schemeClr val="accent1">
+                    <a:shade val="50000"/>
+                  </a:schemeClr>
+                </a:lnRef>
+                <a:fillRef idx="1">
+                  <a:schemeClr val="accent1"/>
+                </a:fillRef>
+                <a:effectRef idx="0">
+                  <a:schemeClr val="accent1"/>
+                </a:effectRef>
+                <a:fontRef idx="minor">
+                  <a:schemeClr val="lt1"/>
+                </a:fontRef>
+              </p:style>
+              <p:txBody>
+                <a:bodyPr rtlCol="0" anchor="ctr"/>
+                <a:lstStyle/>
+                <a:p>
+                  <a:pPr algn="ctr"/>
+                  <a:endParaRPr lang="fr-FR"/>
+                </a:p>
+              </p:txBody>
+            </p:sp>
+            <p:cxnSp>
+              <p:nvCxnSpPr>
+                <p:cNvPr id="23" name="Connecteur droit 22"/>
+                <p:cNvCxnSpPr>
+                  <a:endCxn id="22" idx="2"/>
+                </p:cNvCxnSpPr>
+                <p:nvPr/>
+              </p:nvCxnSpPr>
+              <p:spPr>
+                <a:xfrm flipV="1">
+                  <a:off x="2645776" y="1782184"/>
+                  <a:ext cx="0" cy="360000"/>
+                </a:xfrm>
+                <a:prstGeom prst="line">
+                  <a:avLst/>
+                </a:prstGeom>
+                <a:noFill/>
+                <a:ln w="12700">
+                  <a:solidFill>
+                    <a:srgbClr val="0070C0"/>
+                  </a:solidFill>
+                  <a:headEnd type="oval" w="sm" len="sm"/>
+                </a:ln>
+              </p:spPr>
+              <p:style>
+                <a:lnRef idx="2">
+                  <a:schemeClr val="accent1">
+                    <a:shade val="50000"/>
+                  </a:schemeClr>
+                </a:lnRef>
+                <a:fillRef idx="1">
+                  <a:schemeClr val="accent1"/>
+                </a:fillRef>
+                <a:effectRef idx="0">
+                  <a:schemeClr val="accent1"/>
+                </a:effectRef>
+                <a:fontRef idx="minor">
+                  <a:schemeClr val="lt1"/>
+                </a:fontRef>
+              </p:style>
+            </p:cxnSp>
+            <p:cxnSp>
+              <p:nvCxnSpPr>
+                <p:cNvPr id="24" name="Connecteur droit 23"/>
+                <p:cNvCxnSpPr>
+                  <a:stCxn id="22" idx="0"/>
+                </p:cNvCxnSpPr>
+                <p:nvPr/>
+              </p:nvCxnSpPr>
+              <p:spPr>
+                <a:xfrm flipV="1">
+                  <a:off x="2645776" y="1062184"/>
+                  <a:ext cx="0" cy="360000"/>
+                </a:xfrm>
+                <a:prstGeom prst="line">
+                  <a:avLst/>
+                </a:prstGeom>
+                <a:noFill/>
+                <a:ln w="12700">
+                  <a:solidFill>
+                    <a:srgbClr val="0070C0"/>
+                  </a:solidFill>
+                  <a:headEnd type="none"/>
+                  <a:tailEnd type="oval" w="sm" len="sm"/>
+                </a:ln>
+              </p:spPr>
+              <p:style>
+                <a:lnRef idx="2">
+                  <a:schemeClr val="accent1">
+                    <a:shade val="50000"/>
+                  </a:schemeClr>
+                </a:lnRef>
+                <a:fillRef idx="1">
+                  <a:schemeClr val="accent1"/>
+                </a:fillRef>
+                <a:effectRef idx="0">
+                  <a:schemeClr val="accent1"/>
+                </a:effectRef>
+                <a:fontRef idx="minor">
+                  <a:schemeClr val="lt1"/>
+                </a:fontRef>
+              </p:style>
+            </p:cxnSp>
+          </p:grpSp>
+          <p:grpSp>
+            <p:nvGrpSpPr>
+              <p:cNvPr id="25" name="Groupe 24"/>
+              <p:cNvGrpSpPr/>
+              <p:nvPr/>
+            </p:nvGrpSpPr>
+            <p:grpSpPr>
+              <a:xfrm rot="8100000">
+                <a:off x="1238328" y="1139070"/>
+                <a:ext cx="180000" cy="1080000"/>
+                <a:chOff x="2555776" y="1062184"/>
+                <a:chExt cx="180000" cy="1080000"/>
+              </a:xfrm>
+            </p:grpSpPr>
+            <p:sp>
+              <p:nvSpPr>
+                <p:cNvPr id="26" name="Rectangle 25"/>
+                <p:cNvSpPr/>
+                <p:nvPr/>
+              </p:nvSpPr>
+              <p:spPr>
+                <a:xfrm>
+                  <a:off x="2555776" y="1422184"/>
+                  <a:ext cx="180000" cy="360000"/>
+                </a:xfrm>
+                <a:prstGeom prst="rect">
+                  <a:avLst/>
+                </a:prstGeom>
+                <a:noFill/>
+                <a:ln w="12700">
+                  <a:solidFill>
+                    <a:srgbClr val="00B050"/>
+                  </a:solidFill>
+                </a:ln>
+              </p:spPr>
+              <p:style>
+                <a:lnRef idx="2">
+                  <a:schemeClr val="accent1">
+                    <a:shade val="50000"/>
+                  </a:schemeClr>
+                </a:lnRef>
+                <a:fillRef idx="1">
+                  <a:schemeClr val="accent1"/>
+                </a:fillRef>
+                <a:effectRef idx="0">
+                  <a:schemeClr val="accent1"/>
+                </a:effectRef>
+                <a:fontRef idx="minor">
+                  <a:schemeClr val="lt1"/>
+                </a:fontRef>
+              </p:style>
+              <p:txBody>
+                <a:bodyPr rtlCol="0" anchor="ctr"/>
+                <a:lstStyle/>
+                <a:p>
+                  <a:pPr algn="ctr"/>
+                  <a:endParaRPr lang="fr-FR"/>
+                </a:p>
+              </p:txBody>
+            </p:sp>
+            <p:cxnSp>
+              <p:nvCxnSpPr>
+                <p:cNvPr id="27" name="Connecteur droit 26"/>
+                <p:cNvCxnSpPr>
+                  <a:endCxn id="26" idx="2"/>
+                </p:cNvCxnSpPr>
+                <p:nvPr/>
+              </p:nvCxnSpPr>
+              <p:spPr>
+                <a:xfrm flipV="1">
+                  <a:off x="2645776" y="1782184"/>
+                  <a:ext cx="0" cy="360000"/>
+                </a:xfrm>
+                <a:prstGeom prst="line">
+                  <a:avLst/>
+                </a:prstGeom>
+                <a:noFill/>
+                <a:ln w="12700">
+                  <a:solidFill>
+                    <a:srgbClr val="0070C0"/>
+                  </a:solidFill>
+                  <a:headEnd type="oval" w="sm" len="sm"/>
+                </a:ln>
+              </p:spPr>
+              <p:style>
+                <a:lnRef idx="2">
+                  <a:schemeClr val="accent1">
+                    <a:shade val="50000"/>
+                  </a:schemeClr>
+                </a:lnRef>
+                <a:fillRef idx="1">
+                  <a:schemeClr val="accent1"/>
+                </a:fillRef>
+                <a:effectRef idx="0">
+                  <a:schemeClr val="accent1"/>
+                </a:effectRef>
+                <a:fontRef idx="minor">
+                  <a:schemeClr val="lt1"/>
+                </a:fontRef>
+              </p:style>
+            </p:cxnSp>
+            <p:cxnSp>
+              <p:nvCxnSpPr>
+                <p:cNvPr id="28" name="Connecteur droit 27"/>
+                <p:cNvCxnSpPr>
+                  <a:stCxn id="26" idx="0"/>
+                </p:cNvCxnSpPr>
+                <p:nvPr/>
+              </p:nvCxnSpPr>
+              <p:spPr>
+                <a:xfrm flipV="1">
+                  <a:off x="2645776" y="1062184"/>
+                  <a:ext cx="0" cy="360000"/>
+                </a:xfrm>
+                <a:prstGeom prst="line">
+                  <a:avLst/>
+                </a:prstGeom>
+                <a:noFill/>
+                <a:ln w="12700">
+                  <a:solidFill>
+                    <a:srgbClr val="0070C0"/>
+                  </a:solidFill>
+                  <a:headEnd type="none"/>
+                  <a:tailEnd type="oval" w="sm" len="sm"/>
+                </a:ln>
+              </p:spPr>
+              <p:style>
+                <a:lnRef idx="2">
+                  <a:schemeClr val="accent1">
+                    <a:shade val="50000"/>
+                  </a:schemeClr>
+                </a:lnRef>
+                <a:fillRef idx="1">
+                  <a:schemeClr val="accent1"/>
+                </a:fillRef>
+                <a:effectRef idx="0">
+                  <a:schemeClr val="accent1"/>
+                </a:effectRef>
+                <a:fontRef idx="minor">
+                  <a:schemeClr val="lt1"/>
+                </a:fontRef>
+              </p:style>
+            </p:cxnSp>
+          </p:grpSp>
+          <p:grpSp>
+            <p:nvGrpSpPr>
+              <p:cNvPr id="29" name="Groupe 28"/>
+              <p:cNvGrpSpPr/>
+              <p:nvPr/>
+            </p:nvGrpSpPr>
+            <p:grpSpPr>
+              <a:xfrm rot="8100000">
+                <a:off x="2003792" y="382251"/>
+                <a:ext cx="180000" cy="1080000"/>
+                <a:chOff x="2555776" y="1062184"/>
+                <a:chExt cx="180000" cy="1080000"/>
+              </a:xfrm>
+            </p:grpSpPr>
+            <p:sp>
+              <p:nvSpPr>
+                <p:cNvPr id="30" name="Rectangle 29"/>
+                <p:cNvSpPr/>
+                <p:nvPr/>
+              </p:nvSpPr>
+              <p:spPr>
+                <a:xfrm>
+                  <a:off x="2555776" y="1422184"/>
+                  <a:ext cx="180000" cy="360000"/>
+                </a:xfrm>
+                <a:prstGeom prst="rect">
+                  <a:avLst/>
+                </a:prstGeom>
+                <a:noFill/>
+                <a:ln w="12700">
+                  <a:solidFill>
+                    <a:srgbClr val="FF0000"/>
+                  </a:solidFill>
+                </a:ln>
+              </p:spPr>
+              <p:style>
+                <a:lnRef idx="2">
+                  <a:schemeClr val="accent1">
+                    <a:shade val="50000"/>
+                  </a:schemeClr>
+                </a:lnRef>
+                <a:fillRef idx="1">
+                  <a:schemeClr val="accent1"/>
+                </a:fillRef>
+                <a:effectRef idx="0">
+                  <a:schemeClr val="accent1"/>
+                </a:effectRef>
+                <a:fontRef idx="minor">
+                  <a:schemeClr val="lt1"/>
+                </a:fontRef>
+              </p:style>
+              <p:txBody>
+                <a:bodyPr rtlCol="0" anchor="ctr"/>
+                <a:lstStyle/>
+                <a:p>
+                  <a:pPr algn="ctr"/>
+                  <a:endParaRPr lang="fr-FR"/>
+                </a:p>
+              </p:txBody>
+            </p:sp>
+            <p:cxnSp>
+              <p:nvCxnSpPr>
+                <p:cNvPr id="31" name="Connecteur droit 30"/>
+                <p:cNvCxnSpPr>
+                  <a:endCxn id="30" idx="2"/>
+                </p:cNvCxnSpPr>
+                <p:nvPr/>
+              </p:nvCxnSpPr>
+              <p:spPr>
+                <a:xfrm flipV="1">
+                  <a:off x="2645776" y="1782184"/>
+                  <a:ext cx="0" cy="360000"/>
+                </a:xfrm>
+                <a:prstGeom prst="line">
+                  <a:avLst/>
+                </a:prstGeom>
+                <a:noFill/>
+                <a:ln w="12700">
+                  <a:solidFill>
+                    <a:srgbClr val="0070C0"/>
+                  </a:solidFill>
+                  <a:headEnd type="oval" w="sm" len="sm"/>
+                </a:ln>
+              </p:spPr>
+              <p:style>
+                <a:lnRef idx="2">
+                  <a:schemeClr val="accent1">
+                    <a:shade val="50000"/>
+                  </a:schemeClr>
+                </a:lnRef>
+                <a:fillRef idx="1">
+                  <a:schemeClr val="accent1"/>
+                </a:fillRef>
+                <a:effectRef idx="0">
+                  <a:schemeClr val="accent1"/>
+                </a:effectRef>
+                <a:fontRef idx="minor">
+                  <a:schemeClr val="lt1"/>
+                </a:fontRef>
+              </p:style>
+            </p:cxnSp>
+            <p:cxnSp>
+              <p:nvCxnSpPr>
+                <p:cNvPr id="32" name="Connecteur droit 31"/>
+                <p:cNvCxnSpPr>
+                  <a:stCxn id="30" idx="0"/>
+                </p:cNvCxnSpPr>
+                <p:nvPr/>
+              </p:nvCxnSpPr>
+              <p:spPr>
+                <a:xfrm flipV="1">
+                  <a:off x="2645776" y="1062184"/>
+                  <a:ext cx="0" cy="360000"/>
+                </a:xfrm>
+                <a:prstGeom prst="line">
+                  <a:avLst/>
+                </a:prstGeom>
+                <a:noFill/>
+                <a:ln w="12700">
+                  <a:solidFill>
+                    <a:srgbClr val="0070C0"/>
+                  </a:solidFill>
+                  <a:headEnd type="none"/>
+                  <a:tailEnd type="oval" w="sm" len="sm"/>
+                </a:ln>
+              </p:spPr>
+              <p:style>
+                <a:lnRef idx="2">
+                  <a:schemeClr val="accent1">
+                    <a:shade val="50000"/>
+                  </a:schemeClr>
+                </a:lnRef>
+                <a:fillRef idx="1">
+                  <a:schemeClr val="accent1"/>
+                </a:fillRef>
+                <a:effectRef idx="0">
+                  <a:schemeClr val="accent1"/>
+                </a:effectRef>
+                <a:fontRef idx="minor">
+                  <a:schemeClr val="lt1"/>
+                </a:fontRef>
+              </p:style>
+            </p:cxnSp>
+          </p:grpSp>
+        </p:grpSp>
+        <p:cxnSp>
+          <p:nvCxnSpPr>
+            <p:cNvPr id="34" name="Connecteur droit 33"/>
+            <p:cNvCxnSpPr/>
+            <p:nvPr/>
+          </p:nvCxnSpPr>
+          <p:spPr>
+            <a:xfrm flipH="1">
+              <a:off x="1703714" y="1172930"/>
+              <a:ext cx="1439193" cy="449"/>
+            </a:xfrm>
+            <a:prstGeom prst="line">
+              <a:avLst/>
+            </a:prstGeom>
+            <a:noFill/>
+            <a:ln w="12700">
+              <a:solidFill>
+                <a:srgbClr val="0070C0"/>
+              </a:solidFill>
+              <a:headEnd type="none" w="med" len="med"/>
+              <a:tailEnd type="none" w="med" len="med"/>
+            </a:ln>
+          </p:spPr>
+          <p:style>
+            <a:lnRef idx="2">
+              <a:schemeClr val="accent1">
+                <a:shade val="50000"/>
+              </a:schemeClr>
+            </a:lnRef>
+            <a:fillRef idx="1">
+              <a:schemeClr val="accent1"/>
+            </a:fillRef>
+            <a:effectRef idx="0">
+              <a:schemeClr val="accent1"/>
+            </a:effectRef>
+            <a:fontRef idx="minor">
+              <a:schemeClr val="lt1"/>
+            </a:fontRef>
+          </p:style>
+        </p:cxnSp>
+        <p:cxnSp>
+          <p:nvCxnSpPr>
+            <p:cNvPr id="36" name="Connecteur droit 35"/>
+            <p:cNvCxnSpPr/>
+            <p:nvPr/>
+          </p:nvCxnSpPr>
+          <p:spPr>
+            <a:xfrm flipH="1">
+              <a:off x="1703713" y="2697017"/>
+              <a:ext cx="1439193" cy="449"/>
+            </a:xfrm>
+            <a:prstGeom prst="line">
+              <a:avLst/>
+            </a:prstGeom>
+            <a:noFill/>
+            <a:ln w="12700">
+              <a:solidFill>
+                <a:srgbClr val="0070C0"/>
+              </a:solidFill>
+              <a:headEnd type="none" w="med" len="med"/>
+              <a:tailEnd type="none" w="med" len="med"/>
+            </a:ln>
+          </p:spPr>
+          <p:style>
+            <a:lnRef idx="2">
+              <a:schemeClr val="accent1">
+                <a:shade val="50000"/>
+              </a:schemeClr>
+            </a:lnRef>
+            <a:fillRef idx="1">
+              <a:schemeClr val="accent1"/>
+            </a:fillRef>
+            <a:effectRef idx="0">
+              <a:schemeClr val="accent1"/>
+            </a:effectRef>
+            <a:fontRef idx="minor">
+              <a:schemeClr val="lt1"/>
+            </a:fontRef>
+          </p:style>
+        </p:cxnSp>
+        <p:cxnSp>
+          <p:nvCxnSpPr>
+            <p:cNvPr id="37" name="Connecteur droit 36"/>
+            <p:cNvCxnSpPr/>
+            <p:nvPr/>
+          </p:nvCxnSpPr>
+          <p:spPr>
+            <a:xfrm>
+              <a:off x="1703713" y="1172930"/>
+              <a:ext cx="1" cy="1524536"/>
+            </a:xfrm>
+            <a:prstGeom prst="line">
+              <a:avLst/>
+            </a:prstGeom>
+            <a:noFill/>
+            <a:ln w="12700">
+              <a:solidFill>
+                <a:srgbClr val="0070C0"/>
+              </a:solidFill>
+              <a:headEnd type="none" w="med" len="med"/>
+              <a:tailEnd type="none" w="med" len="med"/>
+            </a:ln>
+          </p:spPr>
+          <p:style>
+            <a:lnRef idx="2">
+              <a:schemeClr val="accent1">
+                <a:shade val="50000"/>
+              </a:schemeClr>
+            </a:lnRef>
+            <a:fillRef idx="1">
+              <a:schemeClr val="accent1"/>
+            </a:fillRef>
+            <a:effectRef idx="0">
+              <a:schemeClr val="accent1"/>
+            </a:effectRef>
+            <a:fontRef idx="minor">
+              <a:schemeClr val="lt1"/>
+            </a:fontRef>
+          </p:style>
+        </p:cxnSp>
+        <p:sp>
+          <p:nvSpPr>
+            <p:cNvPr id="40" name="Ellipse 39"/>
+            <p:cNvSpPr/>
+            <p:nvPr/>
+          </p:nvSpPr>
+          <p:spPr>
+            <a:xfrm>
+              <a:off x="1574652" y="1772816"/>
+              <a:ext cx="270040" cy="270040"/>
+            </a:xfrm>
+            <a:prstGeom prst="ellipse">
+              <a:avLst/>
+            </a:prstGeom>
+            <a:noFill/>
+            <a:ln w="12700">
+              <a:solidFill>
+                <a:srgbClr val="0070C0"/>
+              </a:solidFill>
+            </a:ln>
+          </p:spPr>
+          <p:style>
+            <a:lnRef idx="2">
+              <a:schemeClr val="accent1">
+                <a:shade val="50000"/>
+              </a:schemeClr>
+            </a:lnRef>
+            <a:fillRef idx="1">
+              <a:schemeClr val="accent1"/>
+            </a:fillRef>
+            <a:effectRef idx="0">
+              <a:schemeClr val="accent1"/>
+            </a:effectRef>
+            <a:fontRef idx="minor">
+              <a:schemeClr val="lt1"/>
+            </a:fontRef>
+          </p:style>
+          <p:txBody>
+            <a:bodyPr rtlCol="0" anchor="ctr"/>
+            <a:lstStyle/>
+            <a:p>
+              <a:pPr algn="ctr"/>
+              <a:endParaRPr lang="fr-FR"/>
+            </a:p>
+          </p:txBody>
+        </p:sp>
+        <p:sp>
+          <p:nvSpPr>
+            <p:cNvPr id="41" name="ZoneTexte 40"/>
+            <p:cNvSpPr txBox="1"/>
+            <p:nvPr/>
+          </p:nvSpPr>
+          <p:spPr>
+            <a:xfrm>
+              <a:off x="1205616" y="1781246"/>
+              <a:ext cx="504056" cy="261610"/>
+            </a:xfrm>
+            <a:prstGeom prst="rect">
+              <a:avLst/>
+            </a:prstGeom>
+            <a:noFill/>
+          </p:spPr>
+          <p:txBody>
+            <a:bodyPr wrap="square" rtlCol="0">
+              <a:spAutoFit/>
+            </a:bodyPr>
+            <a:lstStyle/>
+            <a:p>
+              <a:r>
+                <a:rPr lang="fr-FR" sz="1100" dirty="0" smtClean="0"/>
+                <a:t>E</a:t>
+              </a:r>
+              <a:endParaRPr lang="fr-FR" sz="1100" baseline="-25000" dirty="0"/>
+            </a:p>
+          </p:txBody>
+        </p:sp>
+        <p:cxnSp>
+          <p:nvCxnSpPr>
+            <p:cNvPr id="42" name="Connecteur droit 41"/>
+            <p:cNvCxnSpPr/>
+            <p:nvPr/>
+          </p:nvCxnSpPr>
+          <p:spPr>
+            <a:xfrm flipV="1">
+              <a:off x="1481287" y="1736812"/>
+              <a:ext cx="0" cy="342048"/>
+            </a:xfrm>
+            <a:prstGeom prst="line">
+              <a:avLst/>
+            </a:prstGeom>
+            <a:noFill/>
+            <a:ln w="12700">
+              <a:solidFill>
+                <a:srgbClr val="0070C0"/>
+              </a:solidFill>
+              <a:tailEnd type="stealth" w="med" len="lg"/>
+            </a:ln>
+          </p:spPr>
+          <p:style>
+            <a:lnRef idx="2">
+              <a:schemeClr val="accent1">
+                <a:shade val="50000"/>
+              </a:schemeClr>
+            </a:lnRef>
+            <a:fillRef idx="1">
+              <a:schemeClr val="accent1"/>
+            </a:fillRef>
+            <a:effectRef idx="0">
+              <a:schemeClr val="accent1"/>
+            </a:effectRef>
+            <a:fontRef idx="minor">
+              <a:schemeClr val="lt1"/>
+            </a:fontRef>
+          </p:style>
+        </p:cxnSp>
+        <p:cxnSp>
+          <p:nvCxnSpPr>
+            <p:cNvPr id="43" name="Connecteur droit 42"/>
+            <p:cNvCxnSpPr/>
+            <p:nvPr/>
+          </p:nvCxnSpPr>
+          <p:spPr>
+            <a:xfrm flipV="1">
+              <a:off x="1703714" y="1782212"/>
+              <a:ext cx="0" cy="342048"/>
+            </a:xfrm>
+            <a:prstGeom prst="line">
+              <a:avLst/>
+            </a:prstGeom>
+            <a:noFill/>
+            <a:ln w="12700">
+              <a:solidFill>
+                <a:srgbClr val="0070C0"/>
+              </a:solidFill>
+              <a:tailEnd type="triangle" w="sm" len="sm"/>
+            </a:ln>
+          </p:spPr>
+          <p:style>
+            <a:lnRef idx="2">
+              <a:schemeClr val="accent1">
+                <a:shade val="50000"/>
+              </a:schemeClr>
+            </a:lnRef>
+            <a:fillRef idx="1">
+              <a:schemeClr val="accent1"/>
+            </a:fillRef>
+            <a:effectRef idx="0">
+              <a:schemeClr val="accent1"/>
+            </a:effectRef>
+            <a:fontRef idx="minor">
+              <a:schemeClr val="lt1"/>
+            </a:fontRef>
+          </p:style>
+        </p:cxnSp>
+        <p:sp>
+          <p:nvSpPr>
+            <p:cNvPr id="45" name="ZoneTexte 44"/>
+            <p:cNvSpPr txBox="1"/>
+            <p:nvPr/>
+          </p:nvSpPr>
+          <p:spPr>
+            <a:xfrm>
+              <a:off x="2379231" y="2304985"/>
+              <a:ext cx="504056" cy="261610"/>
+            </a:xfrm>
+            <a:prstGeom prst="rect">
+              <a:avLst/>
+            </a:prstGeom>
+            <a:noFill/>
+          </p:spPr>
+          <p:txBody>
+            <a:bodyPr wrap="square" rtlCol="0">
+              <a:spAutoFit/>
+            </a:bodyPr>
+            <a:lstStyle/>
+            <a:p>
+              <a:pPr algn="ctr"/>
+              <a:r>
+                <a:rPr lang="fr-FR" sz="1100" dirty="0" smtClean="0"/>
+                <a:t>R</a:t>
+              </a:r>
+              <a:r>
+                <a:rPr lang="fr-FR" sz="1100" baseline="-25000" dirty="0" smtClean="0"/>
+                <a:t>1</a:t>
+              </a:r>
+              <a:endParaRPr lang="fr-FR" sz="1100" baseline="-25000" dirty="0"/>
+            </a:p>
+          </p:txBody>
+        </p:sp>
+        <p:sp>
+          <p:nvSpPr>
+            <p:cNvPr id="46" name="ZoneTexte 45"/>
+            <p:cNvSpPr txBox="1"/>
+            <p:nvPr/>
+          </p:nvSpPr>
+          <p:spPr>
+            <a:xfrm>
+              <a:off x="3411641" y="2304985"/>
+              <a:ext cx="504056" cy="261610"/>
+            </a:xfrm>
+            <a:prstGeom prst="rect">
+              <a:avLst/>
+            </a:prstGeom>
+            <a:noFill/>
+          </p:spPr>
+          <p:txBody>
+            <a:bodyPr wrap="square" rtlCol="0">
+              <a:spAutoFit/>
+            </a:bodyPr>
+            <a:lstStyle/>
+            <a:p>
+              <a:pPr algn="ctr"/>
+              <a:r>
+                <a:rPr lang="fr-FR" sz="1100" dirty="0" smtClean="0"/>
+                <a:t>R</a:t>
+              </a:r>
+              <a:r>
+                <a:rPr lang="fr-FR" sz="1100" baseline="-25000" dirty="0" smtClean="0"/>
+                <a:t>2</a:t>
+              </a:r>
+              <a:endParaRPr lang="fr-FR" sz="1100" baseline="-25000" dirty="0"/>
+            </a:p>
+          </p:txBody>
+        </p:sp>
+        <p:sp>
+          <p:nvSpPr>
+            <p:cNvPr id="47" name="ZoneTexte 46"/>
+            <p:cNvSpPr txBox="1"/>
+            <p:nvPr/>
+          </p:nvSpPr>
+          <p:spPr>
+            <a:xfrm>
+              <a:off x="3411641" y="1268760"/>
+              <a:ext cx="504056" cy="261610"/>
+            </a:xfrm>
+            <a:prstGeom prst="rect">
+              <a:avLst/>
+            </a:prstGeom>
+            <a:noFill/>
+          </p:spPr>
+          <p:txBody>
+            <a:bodyPr wrap="square" rtlCol="0">
+              <a:spAutoFit/>
+            </a:bodyPr>
+            <a:lstStyle/>
+            <a:p>
+              <a:pPr algn="ctr"/>
+              <a:r>
+                <a:rPr lang="fr-FR" sz="1100" dirty="0" smtClean="0"/>
+                <a:t>R</a:t>
+              </a:r>
+              <a:r>
+                <a:rPr lang="fr-FR" sz="1100" baseline="-25000" dirty="0" smtClean="0"/>
+                <a:t>3</a:t>
+              </a:r>
+              <a:endParaRPr lang="fr-FR" sz="1100" baseline="-25000" dirty="0"/>
+            </a:p>
+          </p:txBody>
+        </p:sp>
+        <p:sp>
+          <p:nvSpPr>
+            <p:cNvPr id="48" name="ZoneTexte 47"/>
+            <p:cNvSpPr txBox="1"/>
+            <p:nvPr/>
+          </p:nvSpPr>
+          <p:spPr>
+            <a:xfrm>
+              <a:off x="2295189" y="1341597"/>
+              <a:ext cx="504056" cy="261610"/>
+            </a:xfrm>
+            <a:prstGeom prst="rect">
+              <a:avLst/>
+            </a:prstGeom>
+            <a:noFill/>
+          </p:spPr>
+          <p:txBody>
+            <a:bodyPr wrap="square" rtlCol="0">
+              <a:spAutoFit/>
+            </a:bodyPr>
+            <a:lstStyle/>
+            <a:p>
+              <a:pPr algn="ctr"/>
+              <a:r>
+                <a:rPr lang="fr-FR" sz="1100" dirty="0" smtClean="0"/>
+                <a:t>R</a:t>
+              </a:r>
+              <a:r>
+                <a:rPr lang="fr-FR" sz="1100" baseline="-25000" dirty="0" smtClean="0"/>
+                <a:t>4</a:t>
+              </a:r>
+              <a:endParaRPr lang="fr-FR" sz="1100" baseline="-25000" dirty="0"/>
+            </a:p>
+          </p:txBody>
+        </p:sp>
+        <p:sp>
+          <p:nvSpPr>
+            <p:cNvPr id="49" name="ZoneTexte 48"/>
+            <p:cNvSpPr txBox="1"/>
+            <p:nvPr/>
+          </p:nvSpPr>
+          <p:spPr>
+            <a:xfrm>
+              <a:off x="2890878" y="911770"/>
+              <a:ext cx="504056" cy="261610"/>
+            </a:xfrm>
+            <a:prstGeom prst="rect">
+              <a:avLst/>
+            </a:prstGeom>
+            <a:noFill/>
+          </p:spPr>
+          <p:txBody>
+            <a:bodyPr wrap="square" rtlCol="0">
+              <a:spAutoFit/>
+            </a:bodyPr>
+            <a:lstStyle/>
+            <a:p>
+              <a:pPr algn="ctr"/>
+              <a:r>
+                <a:rPr lang="fr-FR" sz="1100" dirty="0" smtClean="0"/>
+                <a:t>A</a:t>
+              </a:r>
+              <a:endParaRPr lang="fr-FR" sz="1100" baseline="-25000" dirty="0"/>
+            </a:p>
+          </p:txBody>
+        </p:sp>
+        <p:sp>
+          <p:nvSpPr>
+            <p:cNvPr id="50" name="ZoneTexte 49"/>
+            <p:cNvSpPr txBox="1"/>
+            <p:nvPr/>
+          </p:nvSpPr>
+          <p:spPr>
+            <a:xfrm>
+              <a:off x="2890878" y="2697466"/>
+              <a:ext cx="504056" cy="261610"/>
+            </a:xfrm>
+            <a:prstGeom prst="rect">
+              <a:avLst/>
+            </a:prstGeom>
+            <a:noFill/>
+          </p:spPr>
+          <p:txBody>
+            <a:bodyPr wrap="square" rtlCol="0">
+              <a:spAutoFit/>
+            </a:bodyPr>
+            <a:lstStyle/>
+            <a:p>
+              <a:pPr algn="ctr"/>
+              <a:r>
+                <a:rPr lang="fr-FR" sz="1100" dirty="0" smtClean="0"/>
+                <a:t>B</a:t>
+              </a:r>
+              <a:endParaRPr lang="fr-FR" sz="1100" baseline="-25000" dirty="0"/>
+            </a:p>
+          </p:txBody>
+        </p:sp>
+        <p:sp>
+          <p:nvSpPr>
+            <p:cNvPr id="51" name="ZoneTexte 50"/>
+            <p:cNvSpPr txBox="1"/>
+            <p:nvPr/>
+          </p:nvSpPr>
+          <p:spPr>
+            <a:xfrm>
+              <a:off x="1992953" y="1795339"/>
+              <a:ext cx="580815" cy="384721"/>
+            </a:xfrm>
+            <a:prstGeom prst="rect">
+              <a:avLst/>
+            </a:prstGeom>
+            <a:noFill/>
+          </p:spPr>
+          <p:txBody>
+            <a:bodyPr wrap="square" rtlCol="0">
+              <a:spAutoFit/>
+            </a:bodyPr>
+            <a:lstStyle/>
+            <a:p>
+              <a:pPr algn="ctr"/>
+              <a:r>
+                <a:rPr lang="fr-FR" sz="1100" dirty="0" smtClean="0"/>
+                <a:t>C</a:t>
+              </a:r>
+            </a:p>
+            <a:p>
+              <a:pPr algn="ctr"/>
+              <a:r>
+                <a:rPr lang="fr-FR" sz="800" dirty="0"/>
+                <a:t>(Signal </a:t>
+              </a:r>
+              <a:r>
+                <a:rPr lang="fr-FR" sz="800" dirty="0" smtClean="0"/>
+                <a:t>+)</a:t>
+              </a:r>
+              <a:endParaRPr lang="fr-FR" sz="1100" baseline="-25000" dirty="0"/>
+            </a:p>
+          </p:txBody>
+        </p:sp>
+        <p:sp>
+          <p:nvSpPr>
+            <p:cNvPr id="52" name="ZoneTexte 51"/>
+            <p:cNvSpPr txBox="1"/>
+            <p:nvPr/>
+          </p:nvSpPr>
+          <p:spPr>
+            <a:xfrm>
+              <a:off x="3883878" y="1806251"/>
+              <a:ext cx="1316849" cy="261610"/>
+            </a:xfrm>
+            <a:prstGeom prst="rect">
+              <a:avLst/>
+            </a:prstGeom>
+            <a:noFill/>
+          </p:spPr>
+          <p:txBody>
+            <a:bodyPr wrap="square" rtlCol="0">
+              <a:spAutoFit/>
+            </a:bodyPr>
+            <a:lstStyle/>
+            <a:p>
+              <a:r>
+                <a:rPr lang="fr-FR" sz="1100" dirty="0" smtClean="0"/>
+                <a:t>D </a:t>
+              </a:r>
+              <a:r>
+                <a:rPr lang="fr-FR" sz="800" dirty="0" smtClean="0"/>
+                <a:t>(Signal -)</a:t>
+              </a:r>
+              <a:endParaRPr lang="fr-FR" sz="1100" baseline="-25000" dirty="0"/>
+            </a:p>
+          </p:txBody>
+        </p:sp>
+      </p:grpSp>
+      <p:grpSp>
+        <p:nvGrpSpPr>
+          <p:cNvPr id="2" name="Groupe 1"/>
+          <p:cNvGrpSpPr/>
+          <p:nvPr/>
+        </p:nvGrpSpPr>
+        <p:grpSpPr>
+          <a:xfrm>
+            <a:off x="467544" y="700599"/>
+            <a:ext cx="2085975" cy="2854214"/>
+            <a:chOff x="5004048" y="-119548"/>
+            <a:chExt cx="2085975" cy="2854214"/>
+          </a:xfrm>
+        </p:grpSpPr>
+        <p:pic>
+          <p:nvPicPr>
+            <p:cNvPr id="1026" name="Picture 2"/>
+            <p:cNvPicPr>
+              <a:picLocks noChangeAspect="1" noChangeArrowheads="1"/>
+            </p:cNvPicPr>
+            <p:nvPr/>
+          </p:nvPicPr>
+          <p:blipFill>
+            <a:blip r:embed="rId2">
+              <a:extLst>
+                <a:ext uri="{28A0092B-C50C-407E-A947-70E740481C1C}">
+                  <a14:useLocalDpi xmlns:a14="http://schemas.microsoft.com/office/drawing/2010/main" val="0"/>
+                </a:ext>
+              </a:extLst>
+            </a:blip>
+            <a:srcRect/>
+            <a:stretch>
+              <a:fillRect/>
+            </a:stretch>
+          </p:blipFill>
+          <p:spPr bwMode="auto">
+            <a:xfrm>
+              <a:off x="5004048" y="1239241"/>
+              <a:ext cx="2085975" cy="1495425"/>
+            </a:xfrm>
+            <a:prstGeom prst="rect">
+              <a:avLst/>
+            </a:prstGeom>
+            <a:noFill/>
+            <a:ln>
               <a:noFill/>
-              <a:ln w="12700">
-                <a:solidFill>
-                  <a:srgbClr val="0070C0"/>
-                </a:solidFill>
-              </a:ln>
-            </p:spPr>
-            <p:style>
-              <a:lnRef idx="2">
-                <a:schemeClr val="accent1">
-                  <a:shade val="50000"/>
-                </a:schemeClr>
-              </a:lnRef>
-              <a:fillRef idx="1">
-                <a:schemeClr val="accent1"/>
-              </a:fillRef>
-              <a:effectRef idx="0">
-                <a:schemeClr val="accent1"/>
-              </a:effectRef>
-              <a:fontRef idx="minor">
-                <a:schemeClr val="lt1"/>
-              </a:fontRef>
-            </p:style>
-            <p:txBody>
-              <a:bodyPr rtlCol="0" anchor="ctr"/>
-              <a:lstStyle/>
-              <a:p>
-                <a:pPr algn="ctr"/>
-                <a:endParaRPr lang="fr-FR"/>
-              </a:p>
-            </p:txBody>
-          </p:sp>
-          <p:cxnSp>
-            <p:nvCxnSpPr>
-              <p:cNvPr id="5" name="Connecteur droit 4"/>
-              <p:cNvCxnSpPr>
-                <a:endCxn id="4" idx="2"/>
-              </p:cNvCxnSpPr>
-              <p:nvPr/>
-            </p:nvCxnSpPr>
-            <p:spPr>
-              <a:xfrm flipV="1">
-                <a:off x="2645776" y="1782184"/>
-                <a:ext cx="0" cy="360000"/>
-              </a:xfrm>
-              <a:prstGeom prst="line">
-                <a:avLst/>
-              </a:prstGeom>
-              <a:noFill/>
-              <a:ln w="12700">
-                <a:solidFill>
-                  <a:srgbClr val="0070C0"/>
-                </a:solidFill>
-                <a:headEnd type="oval" w="sm" len="sm"/>
-              </a:ln>
-            </p:spPr>
-            <p:style>
-              <a:lnRef idx="2">
-                <a:schemeClr val="accent1">
-                  <a:shade val="50000"/>
-                </a:schemeClr>
-              </a:lnRef>
-              <a:fillRef idx="1">
-                <a:schemeClr val="accent1"/>
-              </a:fillRef>
-              <a:effectRef idx="0">
-                <a:schemeClr val="accent1"/>
-              </a:effectRef>
-              <a:fontRef idx="minor">
-                <a:schemeClr val="lt1"/>
-              </a:fontRef>
-            </p:style>
-          </p:cxnSp>
-          <p:cxnSp>
-            <p:nvCxnSpPr>
-              <p:cNvPr id="6" name="Connecteur droit 5"/>
-              <p:cNvCxnSpPr>
-                <a:stCxn id="4" idx="0"/>
-              </p:cNvCxnSpPr>
-              <p:nvPr/>
-            </p:nvCxnSpPr>
-            <p:spPr>
-              <a:xfrm flipV="1">
-                <a:off x="2645776" y="1062184"/>
-                <a:ext cx="0" cy="360000"/>
-              </a:xfrm>
-              <a:prstGeom prst="line">
-                <a:avLst/>
-              </a:prstGeom>
-              <a:noFill/>
-              <a:ln w="12700">
-                <a:solidFill>
-                  <a:srgbClr val="0070C0"/>
-                </a:solidFill>
-                <a:headEnd type="none"/>
-                <a:tailEnd type="oval" w="sm" len="sm"/>
-              </a:ln>
-            </p:spPr>
-            <p:style>
-              <a:lnRef idx="2">
-                <a:schemeClr val="accent1">
-                  <a:shade val="50000"/>
-                </a:schemeClr>
-              </a:lnRef>
-              <a:fillRef idx="1">
-                <a:schemeClr val="accent1"/>
-              </a:fillRef>
-              <a:effectRef idx="0">
-                <a:schemeClr val="accent1"/>
-              </a:effectRef>
-              <a:fontRef idx="minor">
-                <a:schemeClr val="lt1"/>
-              </a:fontRef>
-            </p:style>
-          </p:cxnSp>
-        </p:grpSp>
-        <p:grpSp>
-          <p:nvGrpSpPr>
-            <p:cNvPr id="21" name="Groupe 20"/>
-            <p:cNvGrpSpPr/>
+            </a:ln>
+            <a:effectLst/>
+            <a:extLst>
+              <a:ext uri="{909E8E84-426E-40DD-AFC4-6F175D3DCCD1}">
+                <a14:hiddenFill xmlns:a14="http://schemas.microsoft.com/office/drawing/2010/main">
+                  <a:solidFill>
+                    <a:schemeClr val="accent1"/>
+                  </a:solidFill>
+                </a14:hiddenFill>
+              </a:ext>
+              <a:ext uri="{91240B29-F687-4F45-9708-019B960494DF}">
+                <a14:hiddenLine xmlns:a14="http://schemas.microsoft.com/office/drawing/2010/main" w="9525">
+                  <a:solidFill>
+                    <a:schemeClr val="tx1"/>
+                  </a:solidFill>
+                  <a:miter lim="800000"/>
+                  <a:headEnd/>
+                  <a:tailEnd/>
+                </a14:hiddenLine>
+              </a:ext>
+              <a:ext uri="{AF507438-7753-43E0-B8FC-AC1667EBCBE1}">
+                <a14:hiddenEffects xmlns:a14="http://schemas.microsoft.com/office/drawing/2010/main">
+                  <a:effectLst>
+                    <a:outerShdw dist="35921" dir="2700000" algn="ctr" rotWithShape="0">
+                      <a:schemeClr val="bg2"/>
+                    </a:outerShdw>
+                  </a:effectLst>
+                </a14:hiddenEffects>
+              </a:ext>
+            </a:extLst>
+          </p:spPr>
+        </p:pic>
+        <p:sp>
+          <p:nvSpPr>
+            <p:cNvPr id="38" name="ZoneTexte 37"/>
+            <p:cNvSpPr txBox="1"/>
             <p:nvPr/>
-          </p:nvGrpSpPr>
-          <p:grpSpPr>
-            <a:xfrm rot="2700000">
-              <a:off x="2003791" y="1142212"/>
-              <a:ext cx="180000" cy="1080000"/>
-              <a:chOff x="2555776" y="1062184"/>
-              <a:chExt cx="180000" cy="1080000"/>
+          </p:nvSpPr>
+          <p:spPr>
+            <a:xfrm rot="16200000">
+              <a:off x="4608004" y="433723"/>
+              <a:ext cx="1368152" cy="261610"/>
             </a:xfrm>
-          </p:grpSpPr>
-          <p:sp>
-            <p:nvSpPr>
-              <p:cNvPr id="22" name="Rectangle 21"/>
-              <p:cNvSpPr/>
-              <p:nvPr/>
-            </p:nvSpPr>
-            <p:spPr>
-              <a:xfrm>
-                <a:off x="2555776" y="1422184"/>
-                <a:ext cx="180000" cy="360000"/>
-              </a:xfrm>
-              <a:prstGeom prst="rect">
-                <a:avLst/>
-              </a:prstGeom>
-              <a:noFill/>
-              <a:ln w="12700">
-                <a:solidFill>
-                  <a:srgbClr val="0070C0"/>
-                </a:solidFill>
-              </a:ln>
-            </p:spPr>
-            <p:style>
-              <a:lnRef idx="2">
-                <a:schemeClr val="accent1">
-                  <a:shade val="50000"/>
-                </a:schemeClr>
-              </a:lnRef>
-              <a:fillRef idx="1">
-                <a:schemeClr val="accent1"/>
-              </a:fillRef>
-              <a:effectRef idx="0">
-                <a:schemeClr val="accent1"/>
-              </a:effectRef>
-              <a:fontRef idx="minor">
-                <a:schemeClr val="lt1"/>
-              </a:fontRef>
-            </p:style>
-            <p:txBody>
-              <a:bodyPr rtlCol="0" anchor="ctr"/>
-              <a:lstStyle/>
-              <a:p>
-                <a:pPr algn="ctr"/>
-                <a:endParaRPr lang="fr-FR"/>
-              </a:p>
-            </p:txBody>
-          </p:sp>
-          <p:cxnSp>
-            <p:nvCxnSpPr>
-              <p:cNvPr id="23" name="Connecteur droit 22"/>
-              <p:cNvCxnSpPr>
-                <a:endCxn id="22" idx="2"/>
-              </p:cNvCxnSpPr>
-              <p:nvPr/>
-            </p:nvCxnSpPr>
-            <p:spPr>
-              <a:xfrm flipV="1">
-                <a:off x="2645776" y="1782184"/>
-                <a:ext cx="0" cy="360000"/>
-              </a:xfrm>
-              <a:prstGeom prst="line">
-                <a:avLst/>
-              </a:prstGeom>
-              <a:noFill/>
-              <a:ln w="12700">
-                <a:solidFill>
-                  <a:srgbClr val="0070C0"/>
-                </a:solidFill>
-                <a:headEnd type="oval" w="sm" len="sm"/>
-              </a:ln>
-            </p:spPr>
-            <p:style>
-              <a:lnRef idx="2">
-                <a:schemeClr val="accent1">
-                  <a:shade val="50000"/>
-                </a:schemeClr>
-              </a:lnRef>
-              <a:fillRef idx="1">
-                <a:schemeClr val="accent1"/>
-              </a:fillRef>
-              <a:effectRef idx="0">
-                <a:schemeClr val="accent1"/>
-              </a:effectRef>
-              <a:fontRef idx="minor">
-                <a:schemeClr val="lt1"/>
-              </a:fontRef>
-            </p:style>
-          </p:cxnSp>
-          <p:cxnSp>
-            <p:nvCxnSpPr>
-              <p:cNvPr id="24" name="Connecteur droit 23"/>
-              <p:cNvCxnSpPr>
-                <a:stCxn id="22" idx="0"/>
-              </p:cNvCxnSpPr>
-              <p:nvPr/>
-            </p:nvCxnSpPr>
-            <p:spPr>
-              <a:xfrm flipV="1">
-                <a:off x="2645776" y="1062184"/>
-                <a:ext cx="0" cy="360000"/>
-              </a:xfrm>
-              <a:prstGeom prst="line">
-                <a:avLst/>
-              </a:prstGeom>
-              <a:noFill/>
-              <a:ln w="12700">
-                <a:solidFill>
-                  <a:srgbClr val="0070C0"/>
-                </a:solidFill>
-                <a:headEnd type="none"/>
-                <a:tailEnd type="oval" w="sm" len="sm"/>
-              </a:ln>
-            </p:spPr>
-            <p:style>
-              <a:lnRef idx="2">
-                <a:schemeClr val="accent1">
-                  <a:shade val="50000"/>
-                </a:schemeClr>
-              </a:lnRef>
-              <a:fillRef idx="1">
-                <a:schemeClr val="accent1"/>
-              </a:fillRef>
-              <a:effectRef idx="0">
-                <a:schemeClr val="accent1"/>
-              </a:effectRef>
-              <a:fontRef idx="minor">
-                <a:schemeClr val="lt1"/>
-              </a:fontRef>
-            </p:style>
-          </p:cxnSp>
-        </p:grpSp>
-        <p:grpSp>
-          <p:nvGrpSpPr>
-            <p:cNvPr id="25" name="Groupe 24"/>
-            <p:cNvGrpSpPr/>
+            <a:prstGeom prst="rect">
+              <a:avLst/>
+            </a:prstGeom>
+            <a:noFill/>
+          </p:spPr>
+          <p:txBody>
+            <a:bodyPr wrap="square" rtlCol="0">
+              <a:spAutoFit/>
+            </a:bodyPr>
+            <a:lstStyle/>
+            <a:p>
+              <a:r>
+                <a:rPr lang="fr-FR" sz="1100" dirty="0" smtClean="0"/>
+                <a:t>Alim. Pont –</a:t>
+              </a:r>
+              <a:endParaRPr lang="fr-FR" sz="1100" baseline="-25000" dirty="0"/>
+            </a:p>
+          </p:txBody>
+        </p:sp>
+        <p:sp>
+          <p:nvSpPr>
+            <p:cNvPr id="39" name="ZoneTexte 38"/>
+            <p:cNvSpPr txBox="1"/>
             <p:nvPr/>
-          </p:nvGrpSpPr>
-          <p:grpSpPr>
-            <a:xfrm rot="8100000">
-              <a:off x="1238328" y="1139070"/>
-              <a:ext cx="180000" cy="1080000"/>
-              <a:chOff x="2555776" y="1062184"/>
-              <a:chExt cx="180000" cy="1080000"/>
+          </p:nvSpPr>
+          <p:spPr>
+            <a:xfrm rot="16200000">
+              <a:off x="6106961" y="433723"/>
+              <a:ext cx="1368152" cy="261610"/>
             </a:xfrm>
-          </p:grpSpPr>
-          <p:sp>
-            <p:nvSpPr>
-              <p:cNvPr id="26" name="Rectangle 25"/>
-              <p:cNvSpPr/>
-              <p:nvPr/>
-            </p:nvSpPr>
-            <p:spPr>
-              <a:xfrm>
-                <a:off x="2555776" y="1422184"/>
-                <a:ext cx="180000" cy="360000"/>
-              </a:xfrm>
-              <a:prstGeom prst="rect">
-                <a:avLst/>
-              </a:prstGeom>
-              <a:noFill/>
-              <a:ln w="12700">
-                <a:solidFill>
-                  <a:srgbClr val="0070C0"/>
-                </a:solidFill>
-              </a:ln>
-            </p:spPr>
-            <p:style>
-              <a:lnRef idx="2">
-                <a:schemeClr val="accent1">
-                  <a:shade val="50000"/>
-                </a:schemeClr>
-              </a:lnRef>
-              <a:fillRef idx="1">
-                <a:schemeClr val="accent1"/>
-              </a:fillRef>
-              <a:effectRef idx="0">
-                <a:schemeClr val="accent1"/>
-              </a:effectRef>
-              <a:fontRef idx="minor">
-                <a:schemeClr val="lt1"/>
-              </a:fontRef>
-            </p:style>
-            <p:txBody>
-              <a:bodyPr rtlCol="0" anchor="ctr"/>
-              <a:lstStyle/>
-              <a:p>
-                <a:pPr algn="ctr"/>
-                <a:endParaRPr lang="fr-FR"/>
-              </a:p>
-            </p:txBody>
-          </p:sp>
-          <p:cxnSp>
-            <p:nvCxnSpPr>
-              <p:cNvPr id="27" name="Connecteur droit 26"/>
-              <p:cNvCxnSpPr>
-                <a:endCxn id="26" idx="2"/>
-              </p:cNvCxnSpPr>
-              <p:nvPr/>
-            </p:nvCxnSpPr>
-            <p:spPr>
-              <a:xfrm flipV="1">
-                <a:off x="2645776" y="1782184"/>
-                <a:ext cx="0" cy="360000"/>
-              </a:xfrm>
-              <a:prstGeom prst="line">
-                <a:avLst/>
-              </a:prstGeom>
-              <a:noFill/>
-              <a:ln w="12700">
-                <a:solidFill>
-                  <a:srgbClr val="0070C0"/>
-                </a:solidFill>
-                <a:headEnd type="oval" w="sm" len="sm"/>
-              </a:ln>
-            </p:spPr>
-            <p:style>
-              <a:lnRef idx="2">
-                <a:schemeClr val="accent1">
-                  <a:shade val="50000"/>
-                </a:schemeClr>
-              </a:lnRef>
-              <a:fillRef idx="1">
-                <a:schemeClr val="accent1"/>
-              </a:fillRef>
-              <a:effectRef idx="0">
-                <a:schemeClr val="accent1"/>
-              </a:effectRef>
-              <a:fontRef idx="minor">
-                <a:schemeClr val="lt1"/>
-              </a:fontRef>
-            </p:style>
-          </p:cxnSp>
-          <p:cxnSp>
-            <p:nvCxnSpPr>
-              <p:cNvPr id="28" name="Connecteur droit 27"/>
-              <p:cNvCxnSpPr>
-                <a:stCxn id="26" idx="0"/>
-              </p:cNvCxnSpPr>
-              <p:nvPr/>
-            </p:nvCxnSpPr>
-            <p:spPr>
-              <a:xfrm flipV="1">
-                <a:off x="2645776" y="1062184"/>
-                <a:ext cx="0" cy="360000"/>
-              </a:xfrm>
-              <a:prstGeom prst="line">
-                <a:avLst/>
-              </a:prstGeom>
-              <a:noFill/>
-              <a:ln w="12700">
-                <a:solidFill>
-                  <a:srgbClr val="0070C0"/>
-                </a:solidFill>
-                <a:headEnd type="none"/>
-                <a:tailEnd type="oval" w="sm" len="sm"/>
-              </a:ln>
-            </p:spPr>
-            <p:style>
-              <a:lnRef idx="2">
-                <a:schemeClr val="accent1">
-                  <a:shade val="50000"/>
-                </a:schemeClr>
-              </a:lnRef>
-              <a:fillRef idx="1">
-                <a:schemeClr val="accent1"/>
-              </a:fillRef>
-              <a:effectRef idx="0">
-                <a:schemeClr val="accent1"/>
-              </a:effectRef>
-              <a:fontRef idx="minor">
-                <a:schemeClr val="lt1"/>
-              </a:fontRef>
-            </p:style>
-          </p:cxnSp>
-        </p:grpSp>
-        <p:grpSp>
-          <p:nvGrpSpPr>
-            <p:cNvPr id="29" name="Groupe 28"/>
-            <p:cNvGrpSpPr/>
+            <a:prstGeom prst="rect">
+              <a:avLst/>
+            </a:prstGeom>
+            <a:noFill/>
+          </p:spPr>
+          <p:txBody>
+            <a:bodyPr wrap="square" rtlCol="0">
+              <a:spAutoFit/>
+            </a:bodyPr>
+            <a:lstStyle/>
+            <a:p>
+              <a:r>
+                <a:rPr lang="fr-FR" sz="1100" dirty="0" smtClean="0"/>
+                <a:t>Alim. Pont +</a:t>
+              </a:r>
+              <a:endParaRPr lang="fr-FR" sz="1100" baseline="-25000" dirty="0"/>
+            </a:p>
+          </p:txBody>
+        </p:sp>
+        <p:sp>
+          <p:nvSpPr>
+            <p:cNvPr id="44" name="ZoneTexte 43"/>
+            <p:cNvSpPr txBox="1"/>
             <p:nvPr/>
-          </p:nvGrpSpPr>
-          <p:grpSpPr>
-            <a:xfrm rot="8100000">
-              <a:off x="2003792" y="382251"/>
-              <a:ext cx="180000" cy="1080000"/>
-              <a:chOff x="2555776" y="1062184"/>
-              <a:chExt cx="180000" cy="1080000"/>
+          </p:nvSpPr>
+          <p:spPr>
+            <a:xfrm rot="16200000">
+              <a:off x="4913235" y="433723"/>
+              <a:ext cx="1368152" cy="261610"/>
             </a:xfrm>
-          </p:grpSpPr>
-          <p:sp>
-            <p:nvSpPr>
-              <p:cNvPr id="30" name="Rectangle 29"/>
-              <p:cNvSpPr/>
-              <p:nvPr/>
-            </p:nvSpPr>
-            <p:spPr>
-              <a:xfrm>
-                <a:off x="2555776" y="1422184"/>
-                <a:ext cx="180000" cy="360000"/>
-              </a:xfrm>
-              <a:prstGeom prst="rect">
-                <a:avLst/>
-              </a:prstGeom>
-              <a:noFill/>
-              <a:ln w="12700">
-                <a:solidFill>
-                  <a:srgbClr val="0070C0"/>
-                </a:solidFill>
-              </a:ln>
-            </p:spPr>
-            <p:style>
-              <a:lnRef idx="2">
-                <a:schemeClr val="accent1">
-                  <a:shade val="50000"/>
-                </a:schemeClr>
-              </a:lnRef>
-              <a:fillRef idx="1">
-                <a:schemeClr val="accent1"/>
-              </a:fillRef>
-              <a:effectRef idx="0">
-                <a:schemeClr val="accent1"/>
-              </a:effectRef>
-              <a:fontRef idx="minor">
-                <a:schemeClr val="lt1"/>
-              </a:fontRef>
-            </p:style>
-            <p:txBody>
-              <a:bodyPr rtlCol="0" anchor="ctr"/>
-              <a:lstStyle/>
-              <a:p>
-                <a:pPr algn="ctr"/>
-                <a:endParaRPr lang="fr-FR"/>
-              </a:p>
-            </p:txBody>
-          </p:sp>
-          <p:cxnSp>
-            <p:nvCxnSpPr>
-              <p:cNvPr id="31" name="Connecteur droit 30"/>
-              <p:cNvCxnSpPr>
-                <a:endCxn id="30" idx="2"/>
-              </p:cNvCxnSpPr>
-              <p:nvPr/>
-            </p:nvCxnSpPr>
-            <p:spPr>
-              <a:xfrm flipV="1">
-                <a:off x="2645776" y="1782184"/>
-                <a:ext cx="0" cy="360000"/>
-              </a:xfrm>
-              <a:prstGeom prst="line">
-                <a:avLst/>
-              </a:prstGeom>
-              <a:noFill/>
-              <a:ln w="12700">
-                <a:solidFill>
-                  <a:srgbClr val="0070C0"/>
-                </a:solidFill>
-                <a:headEnd type="oval" w="sm" len="sm"/>
-              </a:ln>
-            </p:spPr>
-            <p:style>
-              <a:lnRef idx="2">
-                <a:schemeClr val="accent1">
-                  <a:shade val="50000"/>
-                </a:schemeClr>
-              </a:lnRef>
-              <a:fillRef idx="1">
-                <a:schemeClr val="accent1"/>
-              </a:fillRef>
-              <a:effectRef idx="0">
-                <a:schemeClr val="accent1"/>
-              </a:effectRef>
-              <a:fontRef idx="minor">
-                <a:schemeClr val="lt1"/>
-              </a:fontRef>
-            </p:style>
-          </p:cxnSp>
-          <p:cxnSp>
-            <p:nvCxnSpPr>
-              <p:cNvPr id="32" name="Connecteur droit 31"/>
-              <p:cNvCxnSpPr>
-                <a:stCxn id="30" idx="0"/>
-              </p:cNvCxnSpPr>
-              <p:nvPr/>
-            </p:nvCxnSpPr>
-            <p:spPr>
-              <a:xfrm flipV="1">
-                <a:off x="2645776" y="1062184"/>
-                <a:ext cx="0" cy="360000"/>
-              </a:xfrm>
-              <a:prstGeom prst="line">
-                <a:avLst/>
-              </a:prstGeom>
-              <a:noFill/>
-              <a:ln w="12700">
-                <a:solidFill>
-                  <a:srgbClr val="0070C0"/>
-                </a:solidFill>
-                <a:headEnd type="none"/>
-                <a:tailEnd type="oval" w="sm" len="sm"/>
-              </a:ln>
-            </p:spPr>
-            <p:style>
-              <a:lnRef idx="2">
-                <a:schemeClr val="accent1">
-                  <a:shade val="50000"/>
-                </a:schemeClr>
-              </a:lnRef>
-              <a:fillRef idx="1">
-                <a:schemeClr val="accent1"/>
-              </a:fillRef>
-              <a:effectRef idx="0">
-                <a:schemeClr val="accent1"/>
-              </a:effectRef>
-              <a:fontRef idx="minor">
-                <a:schemeClr val="lt1"/>
-              </a:fontRef>
-            </p:style>
-          </p:cxnSp>
-        </p:grpSp>
+            <a:prstGeom prst="rect">
+              <a:avLst/>
+            </a:prstGeom>
+            <a:noFill/>
+          </p:spPr>
+          <p:txBody>
+            <a:bodyPr wrap="square" rtlCol="0">
+              <a:spAutoFit/>
+            </a:bodyPr>
+            <a:lstStyle/>
+            <a:p>
+              <a:r>
+                <a:rPr lang="fr-FR" sz="1100" dirty="0" smtClean="0"/>
+                <a:t>Signal –</a:t>
+              </a:r>
+              <a:endParaRPr lang="fr-FR" sz="1100" baseline="-25000" dirty="0"/>
+            </a:p>
+          </p:txBody>
+        </p:sp>
+        <p:sp>
+          <p:nvSpPr>
+            <p:cNvPr id="53" name="ZoneTexte 52"/>
+            <p:cNvSpPr txBox="1"/>
+            <p:nvPr/>
+          </p:nvSpPr>
+          <p:spPr>
+            <a:xfrm rot="16200000">
+              <a:off x="5362959" y="433723"/>
+              <a:ext cx="1368152" cy="261610"/>
+            </a:xfrm>
+            <a:prstGeom prst="rect">
+              <a:avLst/>
+            </a:prstGeom>
+            <a:noFill/>
+          </p:spPr>
+          <p:txBody>
+            <a:bodyPr wrap="square" rtlCol="0">
+              <a:spAutoFit/>
+            </a:bodyPr>
+            <a:lstStyle/>
+            <a:p>
+              <a:r>
+                <a:rPr lang="fr-FR" sz="1100" dirty="0" smtClean="0"/>
+                <a:t>Signal +</a:t>
+              </a:r>
+              <a:endParaRPr lang="fr-FR" sz="1100" baseline="-25000" dirty="0"/>
+            </a:p>
+          </p:txBody>
+        </p:sp>
       </p:grpSp>
-      <p:cxnSp>
-        <p:nvCxnSpPr>
-          <p:cNvPr id="34" name="Connecteur droit 33"/>
-          <p:cNvCxnSpPr/>
+      <p:grpSp>
+        <p:nvGrpSpPr>
+          <p:cNvPr id="12" name="Groupe 11"/>
+          <p:cNvGrpSpPr/>
           <p:nvPr/>
-        </p:nvCxnSpPr>
-        <p:spPr>
-          <a:xfrm flipH="1">
-            <a:off x="1703714" y="1172930"/>
-            <a:ext cx="1439193" cy="449"/>
-          </a:xfrm>
-          <a:prstGeom prst="line">
-            <a:avLst/>
-          </a:prstGeom>
-          <a:noFill/>
-          <a:ln w="12700">
-            <a:solidFill>
-              <a:srgbClr val="0070C0"/>
-            </a:solidFill>
-            <a:headEnd type="none" w="med" len="med"/>
-            <a:tailEnd type="none" w="med" len="med"/>
-          </a:ln>
-        </p:spPr>
-        <p:style>
-          <a:lnRef idx="2">
-            <a:schemeClr val="accent1">
-              <a:shade val="50000"/>
-            </a:schemeClr>
-          </a:lnRef>
-          <a:fillRef idx="1">
-            <a:schemeClr val="accent1"/>
-          </a:fillRef>
-          <a:effectRef idx="0">
-            <a:schemeClr val="accent1"/>
-          </a:effectRef>
-          <a:fontRef idx="minor">
-            <a:schemeClr val="lt1"/>
-          </a:fontRef>
-        </p:style>
-      </p:cxnSp>
-      <p:cxnSp>
-        <p:nvCxnSpPr>
-          <p:cNvPr id="36" name="Connecteur droit 35"/>
-          <p:cNvCxnSpPr/>
-          <p:nvPr/>
-        </p:nvCxnSpPr>
-        <p:spPr>
-          <a:xfrm flipH="1">
-            <a:off x="1703713" y="2697017"/>
-            <a:ext cx="1439193" cy="449"/>
-          </a:xfrm>
-          <a:prstGeom prst="line">
-            <a:avLst/>
-          </a:prstGeom>
-          <a:noFill/>
-          <a:ln w="12700">
-            <a:solidFill>
-              <a:srgbClr val="0070C0"/>
-            </a:solidFill>
-            <a:headEnd type="none" w="med" len="med"/>
-            <a:tailEnd type="none" w="med" len="med"/>
-          </a:ln>
-        </p:spPr>
-        <p:style>
-          <a:lnRef idx="2">
-            <a:schemeClr val="accent1">
-              <a:shade val="50000"/>
-            </a:schemeClr>
-          </a:lnRef>
-          <a:fillRef idx="1">
-            <a:schemeClr val="accent1"/>
-          </a:fillRef>
-          <a:effectRef idx="0">
-            <a:schemeClr val="accent1"/>
-          </a:effectRef>
-          <a:fontRef idx="minor">
-            <a:schemeClr val="lt1"/>
-          </a:fontRef>
-        </p:style>
-      </p:cxnSp>
-      <p:cxnSp>
-        <p:nvCxnSpPr>
-          <p:cNvPr id="37" name="Connecteur droit 36"/>
-          <p:cNvCxnSpPr/>
-          <p:nvPr/>
-        </p:nvCxnSpPr>
-        <p:spPr>
+        </p:nvGrpSpPr>
+        <p:grpSpPr>
           <a:xfrm>
-            <a:off x="1703713" y="1172930"/>
-            <a:ext cx="1" cy="1524536"/>
-          </a:xfrm>
-          <a:prstGeom prst="line">
-            <a:avLst/>
-          </a:prstGeom>
-          <a:noFill/>
-          <a:ln w="12700">
-            <a:solidFill>
-              <a:srgbClr val="0070C0"/>
-            </a:solidFill>
-            <a:headEnd type="none" w="med" len="med"/>
-            <a:tailEnd type="none" w="med" len="med"/>
-          </a:ln>
-        </p:spPr>
-        <p:style>
-          <a:lnRef idx="2">
-            <a:schemeClr val="accent1">
-              <a:shade val="50000"/>
-            </a:schemeClr>
-          </a:lnRef>
-          <a:fillRef idx="1">
-            <a:schemeClr val="accent1"/>
-          </a:fillRef>
-          <a:effectRef idx="0">
-            <a:schemeClr val="accent1"/>
-          </a:effectRef>
-          <a:fontRef idx="minor">
-            <a:schemeClr val="lt1"/>
-          </a:fontRef>
-        </p:style>
-      </p:cxnSp>
+            <a:off x="1949232" y="2510756"/>
+            <a:ext cx="305301" cy="467283"/>
+            <a:chOff x="1949232" y="2510756"/>
+            <a:chExt cx="305301" cy="467283"/>
+          </a:xfrm>
+        </p:grpSpPr>
+        <p:cxnSp>
+          <p:nvCxnSpPr>
+            <p:cNvPr id="9" name="Connecteur droit 8"/>
+            <p:cNvCxnSpPr/>
+            <p:nvPr/>
+          </p:nvCxnSpPr>
+          <p:spPr>
+            <a:xfrm>
+              <a:off x="2254533" y="2510756"/>
+              <a:ext cx="0" cy="463242"/>
+            </a:xfrm>
+            <a:prstGeom prst="line">
+              <a:avLst/>
+            </a:prstGeom>
+            <a:ln w="38100">
+              <a:solidFill>
+                <a:srgbClr val="FF0000"/>
+              </a:solidFill>
+            </a:ln>
+          </p:spPr>
+          <p:style>
+            <a:lnRef idx="1">
+              <a:schemeClr val="accent1"/>
+            </a:lnRef>
+            <a:fillRef idx="0">
+              <a:schemeClr val="accent1"/>
+            </a:fillRef>
+            <a:effectRef idx="0">
+              <a:schemeClr val="accent1"/>
+            </a:effectRef>
+            <a:fontRef idx="minor">
+              <a:schemeClr val="tx1"/>
+            </a:fontRef>
+          </p:style>
+        </p:cxnSp>
+        <p:cxnSp>
+          <p:nvCxnSpPr>
+            <p:cNvPr id="54" name="Connecteur droit 53"/>
+            <p:cNvCxnSpPr/>
+            <p:nvPr/>
+          </p:nvCxnSpPr>
+          <p:spPr>
+            <a:xfrm>
+              <a:off x="1949232" y="2514797"/>
+              <a:ext cx="0" cy="463242"/>
+            </a:xfrm>
+            <a:prstGeom prst="line">
+              <a:avLst/>
+            </a:prstGeom>
+            <a:ln w="38100">
+              <a:solidFill>
+                <a:srgbClr val="FF0000"/>
+              </a:solidFill>
+            </a:ln>
+          </p:spPr>
+          <p:style>
+            <a:lnRef idx="1">
+              <a:schemeClr val="accent1"/>
+            </a:lnRef>
+            <a:fillRef idx="0">
+              <a:schemeClr val="accent1"/>
+            </a:fillRef>
+            <a:effectRef idx="0">
+              <a:schemeClr val="accent1"/>
+            </a:effectRef>
+            <a:fontRef idx="minor">
+              <a:schemeClr val="tx1"/>
+            </a:fontRef>
+          </p:style>
+        </p:cxnSp>
+        <p:cxnSp>
+          <p:nvCxnSpPr>
+            <p:cNvPr id="55" name="Connecteur droit 54"/>
+            <p:cNvCxnSpPr/>
+            <p:nvPr/>
+          </p:nvCxnSpPr>
+          <p:spPr>
+            <a:xfrm flipH="1">
+              <a:off x="1949232" y="2959220"/>
+              <a:ext cx="305301" cy="0"/>
+            </a:xfrm>
+            <a:prstGeom prst="line">
+              <a:avLst/>
+            </a:prstGeom>
+            <a:ln w="38100">
+              <a:solidFill>
+                <a:srgbClr val="FF0000"/>
+              </a:solidFill>
+            </a:ln>
+          </p:spPr>
+          <p:style>
+            <a:lnRef idx="1">
+              <a:schemeClr val="accent1"/>
+            </a:lnRef>
+            <a:fillRef idx="0">
+              <a:schemeClr val="accent1"/>
+            </a:fillRef>
+            <a:effectRef idx="0">
+              <a:schemeClr val="accent1"/>
+            </a:effectRef>
+            <a:fontRef idx="minor">
+              <a:schemeClr val="tx1"/>
+            </a:fontRef>
+          </p:style>
+        </p:cxnSp>
+      </p:grpSp>
       <p:sp>
         <p:nvSpPr>
-          <p:cNvPr id="40" name="Ellipse 39"/>
+          <p:cNvPr id="13" name="Arc 12"/>
           <p:cNvSpPr/>
           <p:nvPr/>
         </p:nvSpPr>
         <p:spPr>
           <a:xfrm>
-            <a:off x="1574652" y="1772816"/>
-            <a:ext cx="270040" cy="270040"/>
-          </a:xfrm>
-          <a:prstGeom prst="ellipse">
-            <a:avLst/>
+            <a:off x="2130780" y="1918700"/>
+            <a:ext cx="5249532" cy="1769756"/>
+          </a:xfrm>
+          <a:prstGeom prst="arc">
+            <a:avLst>
+              <a:gd name="adj1" fmla="val 11243340"/>
+              <a:gd name="adj2" fmla="val 17423694"/>
+            </a:avLst>
           </a:prstGeom>
-          <a:noFill/>
-          <a:ln w="12700">
+          <a:ln>
             <a:solidFill>
-              <a:srgbClr val="0070C0"/>
+              <a:srgbClr val="FF0000"/>
             </a:solidFill>
+            <a:tailEnd type="stealth" w="med" len="lg"/>
           </a:ln>
         </p:spPr>
         <p:style>
-          <a:lnRef idx="2">
-            <a:schemeClr val="accent1">
-              <a:shade val="50000"/>
-            </a:schemeClr>
+          <a:lnRef idx="1">
+            <a:schemeClr val="accent1"/>
           </a:lnRef>
-          <a:fillRef idx="1">
+          <a:fillRef idx="0">
             <a:schemeClr val="accent1"/>
           </a:fillRef>
           <a:effectRef idx="0">
             <a:schemeClr val="accent1"/>
           </a:effectRef>
           <a:fontRef idx="minor">
-            <a:schemeClr val="lt1"/>
+            <a:schemeClr val="tx1"/>
           </a:fontRef>
         </p:style>
         <p:txBody>
@@ -3881,16 +4648,517 @@
           </a:p>
         </p:txBody>
       </p:sp>
+      <p:grpSp>
+        <p:nvGrpSpPr>
+          <p:cNvPr id="56" name="Groupe 55"/>
+          <p:cNvGrpSpPr/>
+          <p:nvPr/>
+        </p:nvGrpSpPr>
+        <p:grpSpPr>
+          <a:xfrm>
+            <a:off x="755506" y="2510756"/>
+            <a:ext cx="305301" cy="467283"/>
+            <a:chOff x="1949232" y="2510756"/>
+            <a:chExt cx="305301" cy="467283"/>
+          </a:xfrm>
+        </p:grpSpPr>
+        <p:cxnSp>
+          <p:nvCxnSpPr>
+            <p:cNvPr id="57" name="Connecteur droit 56"/>
+            <p:cNvCxnSpPr/>
+            <p:nvPr/>
+          </p:nvCxnSpPr>
+          <p:spPr>
+            <a:xfrm>
+              <a:off x="2254533" y="2510756"/>
+              <a:ext cx="0" cy="463242"/>
+            </a:xfrm>
+            <a:prstGeom prst="line">
+              <a:avLst/>
+            </a:prstGeom>
+            <a:ln w="38100">
+              <a:solidFill>
+                <a:srgbClr val="FFC000"/>
+              </a:solidFill>
+            </a:ln>
+          </p:spPr>
+          <p:style>
+            <a:lnRef idx="1">
+              <a:schemeClr val="accent1"/>
+            </a:lnRef>
+            <a:fillRef idx="0">
+              <a:schemeClr val="accent1"/>
+            </a:fillRef>
+            <a:effectRef idx="0">
+              <a:schemeClr val="accent1"/>
+            </a:effectRef>
+            <a:fontRef idx="minor">
+              <a:schemeClr val="tx1"/>
+            </a:fontRef>
+          </p:style>
+        </p:cxnSp>
+        <p:cxnSp>
+          <p:nvCxnSpPr>
+            <p:cNvPr id="58" name="Connecteur droit 57"/>
+            <p:cNvCxnSpPr/>
+            <p:nvPr/>
+          </p:nvCxnSpPr>
+          <p:spPr>
+            <a:xfrm>
+              <a:off x="1949232" y="2514797"/>
+              <a:ext cx="0" cy="463242"/>
+            </a:xfrm>
+            <a:prstGeom prst="line">
+              <a:avLst/>
+            </a:prstGeom>
+            <a:ln w="38100">
+              <a:solidFill>
+                <a:srgbClr val="FFC000"/>
+              </a:solidFill>
+            </a:ln>
+          </p:spPr>
+          <p:style>
+            <a:lnRef idx="1">
+              <a:schemeClr val="accent1"/>
+            </a:lnRef>
+            <a:fillRef idx="0">
+              <a:schemeClr val="accent1"/>
+            </a:fillRef>
+            <a:effectRef idx="0">
+              <a:schemeClr val="accent1"/>
+            </a:effectRef>
+            <a:fontRef idx="minor">
+              <a:schemeClr val="tx1"/>
+            </a:fontRef>
+          </p:style>
+        </p:cxnSp>
+        <p:cxnSp>
+          <p:nvCxnSpPr>
+            <p:cNvPr id="59" name="Connecteur droit 58"/>
+            <p:cNvCxnSpPr/>
+            <p:nvPr/>
+          </p:nvCxnSpPr>
+          <p:spPr>
+            <a:xfrm flipH="1">
+              <a:off x="1949232" y="2959220"/>
+              <a:ext cx="305301" cy="0"/>
+            </a:xfrm>
+            <a:prstGeom prst="line">
+              <a:avLst/>
+            </a:prstGeom>
+            <a:ln w="38100">
+              <a:solidFill>
+                <a:srgbClr val="FFC000"/>
+              </a:solidFill>
+            </a:ln>
+          </p:spPr>
+          <p:style>
+            <a:lnRef idx="1">
+              <a:schemeClr val="accent1"/>
+            </a:lnRef>
+            <a:fillRef idx="0">
+              <a:schemeClr val="accent1"/>
+            </a:fillRef>
+            <a:effectRef idx="0">
+              <a:schemeClr val="accent1"/>
+            </a:effectRef>
+            <a:fontRef idx="minor">
+              <a:schemeClr val="tx1"/>
+            </a:fontRef>
+          </p:style>
+        </p:cxnSp>
+      </p:grpSp>
       <p:sp>
         <p:nvSpPr>
-          <p:cNvPr id="41" name="ZoneTexte 40"/>
+          <p:cNvPr id="60" name="Arc 59"/>
+          <p:cNvSpPr/>
+          <p:nvPr/>
+        </p:nvSpPr>
+        <p:spPr>
+          <a:xfrm flipV="1">
+            <a:off x="467544" y="1663690"/>
+            <a:ext cx="5023747" cy="1621294"/>
+          </a:xfrm>
+          <a:prstGeom prst="arc">
+            <a:avLst>
+              <a:gd name="adj1" fmla="val 11586885"/>
+              <a:gd name="adj2" fmla="val 20843436"/>
+            </a:avLst>
+          </a:prstGeom>
+          <a:ln>
+            <a:solidFill>
+              <a:srgbClr val="FFC000"/>
+            </a:solidFill>
+            <a:tailEnd type="stealth" w="med" len="lg"/>
+          </a:ln>
+        </p:spPr>
+        <p:style>
+          <a:lnRef idx="1">
+            <a:schemeClr val="accent1"/>
+          </a:lnRef>
+          <a:fillRef idx="0">
+            <a:schemeClr val="accent1"/>
+          </a:fillRef>
+          <a:effectRef idx="0">
+            <a:schemeClr val="accent1"/>
+          </a:effectRef>
+          <a:fontRef idx="minor">
+            <a:schemeClr val="tx1"/>
+          </a:fontRef>
+        </p:style>
+        <p:txBody>
+          <a:bodyPr rtlCol="0" anchor="ctr"/>
+          <a:lstStyle/>
+          <a:p>
+            <a:pPr algn="ctr"/>
+            <a:endParaRPr lang="fr-FR"/>
+          </a:p>
+        </p:txBody>
+      </p:sp>
+      <p:grpSp>
+        <p:nvGrpSpPr>
+          <p:cNvPr id="61" name="Groupe 60"/>
+          <p:cNvGrpSpPr/>
+          <p:nvPr/>
+        </p:nvGrpSpPr>
+        <p:grpSpPr>
+          <a:xfrm rot="5400000">
+            <a:off x="755505" y="2490364"/>
+            <a:ext cx="305301" cy="467283"/>
+            <a:chOff x="1949232" y="2510756"/>
+            <a:chExt cx="305301" cy="467283"/>
+          </a:xfrm>
+        </p:grpSpPr>
+        <p:cxnSp>
+          <p:nvCxnSpPr>
+            <p:cNvPr id="62" name="Connecteur droit 61"/>
+            <p:cNvCxnSpPr/>
+            <p:nvPr/>
+          </p:nvCxnSpPr>
+          <p:spPr>
+            <a:xfrm>
+              <a:off x="2254533" y="2510756"/>
+              <a:ext cx="0" cy="463242"/>
+            </a:xfrm>
+            <a:prstGeom prst="line">
+              <a:avLst/>
+            </a:prstGeom>
+            <a:ln w="38100">
+              <a:solidFill>
+                <a:srgbClr val="00B050"/>
+              </a:solidFill>
+            </a:ln>
+          </p:spPr>
+          <p:style>
+            <a:lnRef idx="1">
+              <a:schemeClr val="accent1"/>
+            </a:lnRef>
+            <a:fillRef idx="0">
+              <a:schemeClr val="accent1"/>
+            </a:fillRef>
+            <a:effectRef idx="0">
+              <a:schemeClr val="accent1"/>
+            </a:effectRef>
+            <a:fontRef idx="minor">
+              <a:schemeClr val="tx1"/>
+            </a:fontRef>
+          </p:style>
+        </p:cxnSp>
+        <p:cxnSp>
+          <p:nvCxnSpPr>
+            <p:cNvPr id="63" name="Connecteur droit 62"/>
+            <p:cNvCxnSpPr/>
+            <p:nvPr/>
+          </p:nvCxnSpPr>
+          <p:spPr>
+            <a:xfrm>
+              <a:off x="1949232" y="2514797"/>
+              <a:ext cx="0" cy="463242"/>
+            </a:xfrm>
+            <a:prstGeom prst="line">
+              <a:avLst/>
+            </a:prstGeom>
+            <a:ln w="38100">
+              <a:solidFill>
+                <a:srgbClr val="00B050"/>
+              </a:solidFill>
+            </a:ln>
+          </p:spPr>
+          <p:style>
+            <a:lnRef idx="1">
+              <a:schemeClr val="accent1"/>
+            </a:lnRef>
+            <a:fillRef idx="0">
+              <a:schemeClr val="accent1"/>
+            </a:fillRef>
+            <a:effectRef idx="0">
+              <a:schemeClr val="accent1"/>
+            </a:effectRef>
+            <a:fontRef idx="minor">
+              <a:schemeClr val="tx1"/>
+            </a:fontRef>
+          </p:style>
+        </p:cxnSp>
+        <p:cxnSp>
+          <p:nvCxnSpPr>
+            <p:cNvPr id="64" name="Connecteur droit 63"/>
+            <p:cNvCxnSpPr/>
+            <p:nvPr/>
+          </p:nvCxnSpPr>
+          <p:spPr>
+            <a:xfrm flipH="1">
+              <a:off x="1949232" y="2959220"/>
+              <a:ext cx="305301" cy="0"/>
+            </a:xfrm>
+            <a:prstGeom prst="line">
+              <a:avLst/>
+            </a:prstGeom>
+            <a:ln w="38100">
+              <a:solidFill>
+                <a:srgbClr val="00B050"/>
+              </a:solidFill>
+            </a:ln>
+          </p:spPr>
+          <p:style>
+            <a:lnRef idx="1">
+              <a:schemeClr val="accent1"/>
+            </a:lnRef>
+            <a:fillRef idx="0">
+              <a:schemeClr val="accent1"/>
+            </a:fillRef>
+            <a:effectRef idx="0">
+              <a:schemeClr val="accent1"/>
+            </a:effectRef>
+            <a:fontRef idx="minor">
+              <a:schemeClr val="tx1"/>
+            </a:fontRef>
+          </p:style>
+        </p:cxnSp>
+      </p:grpSp>
+      <p:sp>
+        <p:nvSpPr>
+          <p:cNvPr id="65" name="Arc 64"/>
+          <p:cNvSpPr/>
+          <p:nvPr/>
+        </p:nvSpPr>
+        <p:spPr>
+          <a:xfrm flipV="1">
+            <a:off x="643682" y="1610489"/>
+            <a:ext cx="3949805" cy="1621294"/>
+          </a:xfrm>
+          <a:prstGeom prst="arc">
+            <a:avLst>
+              <a:gd name="adj1" fmla="val 11586885"/>
+              <a:gd name="adj2" fmla="val 20843436"/>
+            </a:avLst>
+          </a:prstGeom>
+          <a:ln>
+            <a:solidFill>
+              <a:srgbClr val="00B050"/>
+            </a:solidFill>
+            <a:tailEnd type="stealth" w="med" len="lg"/>
+          </a:ln>
+        </p:spPr>
+        <p:style>
+          <a:lnRef idx="1">
+            <a:schemeClr val="accent1"/>
+          </a:lnRef>
+          <a:fillRef idx="0">
+            <a:schemeClr val="accent1"/>
+          </a:fillRef>
+          <a:effectRef idx="0">
+            <a:schemeClr val="accent1"/>
+          </a:effectRef>
+          <a:fontRef idx="minor">
+            <a:schemeClr val="tx1"/>
+          </a:fontRef>
+        </p:style>
+        <p:txBody>
+          <a:bodyPr rtlCol="0" anchor="ctr"/>
+          <a:lstStyle/>
+          <a:p>
+            <a:pPr algn="ctr"/>
+            <a:endParaRPr lang="fr-FR"/>
+          </a:p>
+        </p:txBody>
+      </p:sp>
+      <p:grpSp>
+        <p:nvGrpSpPr>
+          <p:cNvPr id="66" name="Groupe 65"/>
+          <p:cNvGrpSpPr/>
+          <p:nvPr/>
+        </p:nvGrpSpPr>
+        <p:grpSpPr>
+          <a:xfrm rot="16200000" flipH="1">
+            <a:off x="1949231" y="2512776"/>
+            <a:ext cx="305301" cy="467283"/>
+            <a:chOff x="1949232" y="2510756"/>
+            <a:chExt cx="305301" cy="467283"/>
+          </a:xfrm>
+        </p:grpSpPr>
+        <p:cxnSp>
+          <p:nvCxnSpPr>
+            <p:cNvPr id="67" name="Connecteur droit 66"/>
+            <p:cNvCxnSpPr/>
+            <p:nvPr/>
+          </p:nvCxnSpPr>
+          <p:spPr>
+            <a:xfrm>
+              <a:off x="2254533" y="2510756"/>
+              <a:ext cx="0" cy="463242"/>
+            </a:xfrm>
+            <a:prstGeom prst="line">
+              <a:avLst/>
+            </a:prstGeom>
+            <a:ln w="38100">
+              <a:solidFill>
+                <a:srgbClr val="7030A0"/>
+              </a:solidFill>
+            </a:ln>
+          </p:spPr>
+          <p:style>
+            <a:lnRef idx="1">
+              <a:schemeClr val="accent1"/>
+            </a:lnRef>
+            <a:fillRef idx="0">
+              <a:schemeClr val="accent1"/>
+            </a:fillRef>
+            <a:effectRef idx="0">
+              <a:schemeClr val="accent1"/>
+            </a:effectRef>
+            <a:fontRef idx="minor">
+              <a:schemeClr val="tx1"/>
+            </a:fontRef>
+          </p:style>
+        </p:cxnSp>
+        <p:cxnSp>
+          <p:nvCxnSpPr>
+            <p:cNvPr id="68" name="Connecteur droit 67"/>
+            <p:cNvCxnSpPr/>
+            <p:nvPr/>
+          </p:nvCxnSpPr>
+          <p:spPr>
+            <a:xfrm>
+              <a:off x="1949232" y="2514797"/>
+              <a:ext cx="0" cy="463242"/>
+            </a:xfrm>
+            <a:prstGeom prst="line">
+              <a:avLst/>
+            </a:prstGeom>
+            <a:ln w="38100">
+              <a:solidFill>
+                <a:srgbClr val="7030A0"/>
+              </a:solidFill>
+            </a:ln>
+          </p:spPr>
+          <p:style>
+            <a:lnRef idx="1">
+              <a:schemeClr val="accent1"/>
+            </a:lnRef>
+            <a:fillRef idx="0">
+              <a:schemeClr val="accent1"/>
+            </a:fillRef>
+            <a:effectRef idx="0">
+              <a:schemeClr val="accent1"/>
+            </a:effectRef>
+            <a:fontRef idx="minor">
+              <a:schemeClr val="tx1"/>
+            </a:fontRef>
+          </p:style>
+        </p:cxnSp>
+        <p:cxnSp>
+          <p:nvCxnSpPr>
+            <p:cNvPr id="69" name="Connecteur droit 68"/>
+            <p:cNvCxnSpPr/>
+            <p:nvPr/>
+          </p:nvCxnSpPr>
+          <p:spPr>
+            <a:xfrm flipH="1">
+              <a:off x="1949232" y="2959220"/>
+              <a:ext cx="305301" cy="0"/>
+            </a:xfrm>
+            <a:prstGeom prst="line">
+              <a:avLst/>
+            </a:prstGeom>
+            <a:ln w="38100">
+              <a:solidFill>
+                <a:srgbClr val="7030A0"/>
+              </a:solidFill>
+            </a:ln>
+          </p:spPr>
+          <p:style>
+            <a:lnRef idx="1">
+              <a:schemeClr val="accent1"/>
+            </a:lnRef>
+            <a:fillRef idx="0">
+              <a:schemeClr val="accent1"/>
+            </a:fillRef>
+            <a:effectRef idx="0">
+              <a:schemeClr val="accent1"/>
+            </a:effectRef>
+            <a:fontRef idx="minor">
+              <a:schemeClr val="tx1"/>
+            </a:fontRef>
+          </p:style>
+        </p:cxnSp>
+      </p:grpSp>
+      <p:sp>
+        <p:nvSpPr>
+          <p:cNvPr id="70" name="Arc 69"/>
+          <p:cNvSpPr/>
+          <p:nvPr/>
+        </p:nvSpPr>
+        <p:spPr>
+          <a:xfrm>
+            <a:off x="2254532" y="2119359"/>
+            <a:ext cx="3901644" cy="1769756"/>
+          </a:xfrm>
+          <a:prstGeom prst="arc">
+            <a:avLst>
+              <a:gd name="adj1" fmla="val 11243340"/>
+              <a:gd name="adj2" fmla="val 16453927"/>
+            </a:avLst>
+          </a:prstGeom>
+          <a:ln>
+            <a:solidFill>
+              <a:srgbClr val="7030A0"/>
+            </a:solidFill>
+            <a:tailEnd type="stealth" w="med" len="lg"/>
+          </a:ln>
+        </p:spPr>
+        <p:style>
+          <a:lnRef idx="1">
+            <a:schemeClr val="accent1"/>
+          </a:lnRef>
+          <a:fillRef idx="0">
+            <a:schemeClr val="accent1"/>
+          </a:fillRef>
+          <a:effectRef idx="0">
+            <a:schemeClr val="accent1"/>
+          </a:effectRef>
+          <a:fontRef idx="minor">
+            <a:schemeClr val="tx1"/>
+          </a:fontRef>
+        </p:style>
+        <p:txBody>
+          <a:bodyPr rtlCol="0" anchor="ctr"/>
+          <a:lstStyle/>
+          <a:p>
+            <a:pPr algn="ctr"/>
+            <a:endParaRPr lang="fr-FR"/>
+          </a:p>
+        </p:txBody>
+      </p:sp>
+      <p:sp>
+        <p:nvSpPr>
+          <p:cNvPr id="14" name="ZoneTexte 13"/>
           <p:cNvSpPr txBox="1"/>
           <p:nvPr/>
         </p:nvSpPr>
         <p:spPr>
           <a:xfrm>
-            <a:off x="1205616" y="1781246"/>
-            <a:ext cx="504056" cy="261610"/>
+            <a:off x="467544" y="3688456"/>
+            <a:ext cx="2085974" cy="523220"/>
           </a:xfrm>
           <a:prstGeom prst="rect">
             <a:avLst/>
@@ -3903,102 +5171,25 @@
           </a:bodyPr>
           <a:lstStyle/>
           <a:p>
+            <a:pPr algn="ctr"/>
             <a:r>
-              <a:rPr lang="fr-FR" sz="1100" dirty="0" smtClean="0"/>
-              <a:t>E</a:t>
+              <a:rPr lang="fr-FR" sz="1400" dirty="0" smtClean="0"/>
+              <a:t>Schéma de câblage électrique</a:t>
             </a:r>
-            <a:endParaRPr lang="fr-FR" sz="1100" baseline="-25000" dirty="0"/>
+            <a:endParaRPr lang="fr-FR" sz="1400" dirty="0"/>
           </a:p>
         </p:txBody>
       </p:sp>
-      <p:cxnSp>
-        <p:nvCxnSpPr>
-          <p:cNvPr id="42" name="Connecteur droit 41"/>
-          <p:cNvCxnSpPr/>
-          <p:nvPr/>
-        </p:nvCxnSpPr>
-        <p:spPr>
-          <a:xfrm flipV="1">
-            <a:off x="1481287" y="1736812"/>
-            <a:ext cx="0" cy="342048"/>
-          </a:xfrm>
-          <a:prstGeom prst="line">
-            <a:avLst/>
-          </a:prstGeom>
-          <a:noFill/>
-          <a:ln w="12700">
-            <a:solidFill>
-              <a:srgbClr val="0070C0"/>
-            </a:solidFill>
-            <a:tailEnd type="stealth" w="med" len="lg"/>
-          </a:ln>
-        </p:spPr>
-        <p:style>
-          <a:lnRef idx="2">
-            <a:schemeClr val="accent1">
-              <a:shade val="50000"/>
-            </a:schemeClr>
-          </a:lnRef>
-          <a:fillRef idx="1">
-            <a:schemeClr val="accent1"/>
-          </a:fillRef>
-          <a:effectRef idx="0">
-            <a:schemeClr val="accent1"/>
-          </a:effectRef>
-          <a:fontRef idx="minor">
-            <a:schemeClr val="lt1"/>
-          </a:fontRef>
-        </p:style>
-      </p:cxnSp>
-      <p:cxnSp>
-        <p:nvCxnSpPr>
-          <p:cNvPr id="43" name="Connecteur droit 42"/>
-          <p:cNvCxnSpPr/>
-          <p:nvPr/>
-        </p:nvCxnSpPr>
-        <p:spPr>
-          <a:xfrm flipV="1">
-            <a:off x="1703714" y="1782212"/>
-            <a:ext cx="0" cy="342048"/>
-          </a:xfrm>
-          <a:prstGeom prst="line">
-            <a:avLst/>
-          </a:prstGeom>
-          <a:noFill/>
-          <a:ln w="12700">
-            <a:solidFill>
-              <a:srgbClr val="0070C0"/>
-            </a:solidFill>
-            <a:tailEnd type="triangle" w="sm" len="sm"/>
-          </a:ln>
-        </p:spPr>
-        <p:style>
-          <a:lnRef idx="2">
-            <a:schemeClr val="accent1">
-              <a:shade val="50000"/>
-            </a:schemeClr>
-          </a:lnRef>
-          <a:fillRef idx="1">
-            <a:schemeClr val="accent1"/>
-          </a:fillRef>
-          <a:effectRef idx="0">
-            <a:schemeClr val="accent1"/>
-          </a:effectRef>
-          <a:fontRef idx="minor">
-            <a:schemeClr val="lt1"/>
-          </a:fontRef>
-        </p:style>
-      </p:cxnSp>
       <p:sp>
         <p:nvSpPr>
-          <p:cNvPr id="45" name="ZoneTexte 44"/>
+          <p:cNvPr id="71" name="ZoneTexte 70"/>
           <p:cNvSpPr txBox="1"/>
           <p:nvPr/>
         </p:nvSpPr>
         <p:spPr>
           <a:xfrm>
-            <a:off x="2379231" y="2304985"/>
-            <a:ext cx="504056" cy="261610"/>
+            <a:off x="3413913" y="3697868"/>
+            <a:ext cx="2211984" cy="523220"/>
           </a:xfrm>
           <a:prstGeom prst="rect">
             <a:avLst/>
@@ -4013,243 +5204,10 @@
           <a:p>
             <a:pPr algn="ctr"/>
             <a:r>
-              <a:rPr lang="fr-FR" sz="1100" dirty="0" smtClean="0"/>
-              <a:t>R</a:t>
+              <a:rPr lang="fr-FR" sz="1400" dirty="0" smtClean="0"/>
+              <a:t>Modélisation par schéma électrique</a:t>
             </a:r>
-            <a:r>
-              <a:rPr lang="fr-FR" sz="1100" baseline="-25000" dirty="0" smtClean="0"/>
-              <a:t>1</a:t>
-            </a:r>
-            <a:endParaRPr lang="fr-FR" sz="1100" baseline="-25000" dirty="0"/>
-          </a:p>
-        </p:txBody>
-      </p:sp>
-      <p:sp>
-        <p:nvSpPr>
-          <p:cNvPr id="46" name="ZoneTexte 45"/>
-          <p:cNvSpPr txBox="1"/>
-          <p:nvPr/>
-        </p:nvSpPr>
-        <p:spPr>
-          <a:xfrm>
-            <a:off x="3411641" y="2304985"/>
-            <a:ext cx="504056" cy="261610"/>
-          </a:xfrm>
-          <a:prstGeom prst="rect">
-            <a:avLst/>
-          </a:prstGeom>
-          <a:noFill/>
-        </p:spPr>
-        <p:txBody>
-          <a:bodyPr wrap="square" rtlCol="0">
-            <a:spAutoFit/>
-          </a:bodyPr>
-          <a:lstStyle/>
-          <a:p>
-            <a:pPr algn="ctr"/>
-            <a:r>
-              <a:rPr lang="fr-FR" sz="1100" dirty="0" smtClean="0"/>
-              <a:t>R</a:t>
-            </a:r>
-            <a:r>
-              <a:rPr lang="fr-FR" sz="1100" baseline="-25000" dirty="0" smtClean="0"/>
-              <a:t>2</a:t>
-            </a:r>
-            <a:endParaRPr lang="fr-FR" sz="1100" baseline="-25000" dirty="0"/>
-          </a:p>
-        </p:txBody>
-      </p:sp>
-      <p:sp>
-        <p:nvSpPr>
-          <p:cNvPr id="47" name="ZoneTexte 46"/>
-          <p:cNvSpPr txBox="1"/>
-          <p:nvPr/>
-        </p:nvSpPr>
-        <p:spPr>
-          <a:xfrm>
-            <a:off x="3411641" y="1268760"/>
-            <a:ext cx="504056" cy="261610"/>
-          </a:xfrm>
-          <a:prstGeom prst="rect">
-            <a:avLst/>
-          </a:prstGeom>
-          <a:noFill/>
-        </p:spPr>
-        <p:txBody>
-          <a:bodyPr wrap="square" rtlCol="0">
-            <a:spAutoFit/>
-          </a:bodyPr>
-          <a:lstStyle/>
-          <a:p>
-            <a:pPr algn="ctr"/>
-            <a:r>
-              <a:rPr lang="fr-FR" sz="1100" dirty="0" smtClean="0"/>
-              <a:t>R</a:t>
-            </a:r>
-            <a:r>
-              <a:rPr lang="fr-FR" sz="1100" baseline="-25000" dirty="0" smtClean="0"/>
-              <a:t>3</a:t>
-            </a:r>
-            <a:endParaRPr lang="fr-FR" sz="1100" baseline="-25000" dirty="0"/>
-          </a:p>
-        </p:txBody>
-      </p:sp>
-      <p:sp>
-        <p:nvSpPr>
-          <p:cNvPr id="48" name="ZoneTexte 47"/>
-          <p:cNvSpPr txBox="1"/>
-          <p:nvPr/>
-        </p:nvSpPr>
-        <p:spPr>
-          <a:xfrm>
-            <a:off x="2295189" y="1341597"/>
-            <a:ext cx="504056" cy="261610"/>
-          </a:xfrm>
-          <a:prstGeom prst="rect">
-            <a:avLst/>
-          </a:prstGeom>
-          <a:noFill/>
-        </p:spPr>
-        <p:txBody>
-          <a:bodyPr wrap="square" rtlCol="0">
-            <a:spAutoFit/>
-          </a:bodyPr>
-          <a:lstStyle/>
-          <a:p>
-            <a:pPr algn="ctr"/>
-            <a:r>
-              <a:rPr lang="fr-FR" sz="1100" dirty="0" smtClean="0"/>
-              <a:t>R</a:t>
-            </a:r>
-            <a:r>
-              <a:rPr lang="fr-FR" sz="1100" baseline="-25000" dirty="0" smtClean="0"/>
-              <a:t>4</a:t>
-            </a:r>
-            <a:endParaRPr lang="fr-FR" sz="1100" baseline="-25000" dirty="0"/>
-          </a:p>
-        </p:txBody>
-      </p:sp>
-      <p:sp>
-        <p:nvSpPr>
-          <p:cNvPr id="49" name="ZoneTexte 48"/>
-          <p:cNvSpPr txBox="1"/>
-          <p:nvPr/>
-        </p:nvSpPr>
-        <p:spPr>
-          <a:xfrm>
-            <a:off x="2890878" y="911770"/>
-            <a:ext cx="504056" cy="261610"/>
-          </a:xfrm>
-          <a:prstGeom prst="rect">
-            <a:avLst/>
-          </a:prstGeom>
-          <a:noFill/>
-        </p:spPr>
-        <p:txBody>
-          <a:bodyPr wrap="square" rtlCol="0">
-            <a:spAutoFit/>
-          </a:bodyPr>
-          <a:lstStyle/>
-          <a:p>
-            <a:pPr algn="ctr"/>
-            <a:r>
-              <a:rPr lang="fr-FR" sz="1100" dirty="0" smtClean="0"/>
-              <a:t>A</a:t>
-            </a:r>
-            <a:endParaRPr lang="fr-FR" sz="1100" baseline="-25000" dirty="0"/>
-          </a:p>
-        </p:txBody>
-      </p:sp>
-      <p:sp>
-        <p:nvSpPr>
-          <p:cNvPr id="50" name="ZoneTexte 49"/>
-          <p:cNvSpPr txBox="1"/>
-          <p:nvPr/>
-        </p:nvSpPr>
-        <p:spPr>
-          <a:xfrm>
-            <a:off x="2890878" y="2697466"/>
-            <a:ext cx="504056" cy="261610"/>
-          </a:xfrm>
-          <a:prstGeom prst="rect">
-            <a:avLst/>
-          </a:prstGeom>
-          <a:noFill/>
-        </p:spPr>
-        <p:txBody>
-          <a:bodyPr wrap="square" rtlCol="0">
-            <a:spAutoFit/>
-          </a:bodyPr>
-          <a:lstStyle/>
-          <a:p>
-            <a:pPr algn="ctr"/>
-            <a:r>
-              <a:rPr lang="fr-FR" sz="1100" dirty="0" smtClean="0"/>
-              <a:t>B</a:t>
-            </a:r>
-            <a:endParaRPr lang="fr-FR" sz="1100" baseline="-25000" dirty="0"/>
-          </a:p>
-        </p:txBody>
-      </p:sp>
-      <p:sp>
-        <p:nvSpPr>
-          <p:cNvPr id="51" name="ZoneTexte 50"/>
-          <p:cNvSpPr txBox="1"/>
-          <p:nvPr/>
-        </p:nvSpPr>
-        <p:spPr>
-          <a:xfrm>
-            <a:off x="2002455" y="1795869"/>
-            <a:ext cx="504056" cy="261610"/>
-          </a:xfrm>
-          <a:prstGeom prst="rect">
-            <a:avLst/>
-          </a:prstGeom>
-          <a:noFill/>
-        </p:spPr>
-        <p:txBody>
-          <a:bodyPr wrap="square" rtlCol="0">
-            <a:spAutoFit/>
-          </a:bodyPr>
-          <a:lstStyle/>
-          <a:p>
-            <a:pPr algn="ctr"/>
-            <a:r>
-              <a:rPr lang="fr-FR" sz="1100" dirty="0" smtClean="0"/>
-              <a:t>C</a:t>
-            </a:r>
-            <a:endParaRPr lang="fr-FR" sz="1100" baseline="-25000" dirty="0"/>
-          </a:p>
-        </p:txBody>
-      </p:sp>
-      <p:sp>
-        <p:nvSpPr>
-          <p:cNvPr id="52" name="ZoneTexte 51"/>
-          <p:cNvSpPr txBox="1"/>
-          <p:nvPr/>
-        </p:nvSpPr>
-        <p:spPr>
-          <a:xfrm>
-            <a:off x="3777199" y="1806251"/>
-            <a:ext cx="504056" cy="261610"/>
-          </a:xfrm>
-          <a:prstGeom prst="rect">
-            <a:avLst/>
-          </a:prstGeom>
-          <a:noFill/>
-        </p:spPr>
-        <p:txBody>
-          <a:bodyPr wrap="square" rtlCol="0">
-            <a:spAutoFit/>
-          </a:bodyPr>
-          <a:lstStyle/>
-          <a:p>
-            <a:pPr algn="ctr"/>
-            <a:r>
-              <a:rPr lang="fr-FR" sz="1100" dirty="0" smtClean="0"/>
-              <a:t>D</a:t>
-            </a:r>
-            <a:endParaRPr lang="fr-FR" sz="1100" baseline="-25000" dirty="0"/>
+            <a:endParaRPr lang="fr-FR" sz="1400" dirty="0"/>
           </a:p>
         </p:txBody>
       </p:sp>

</xml_diff>